<commit_message>
Update Présentation avancement TFE.pptx
</commit_message>
<xml_diff>
--- a/présentation power point/Présentation avancement TFE.pptx
+++ b/présentation power point/Présentation avancement TFE.pptx
@@ -5,23 +5,24 @@
     <p:sldMasterId id="2147483648" r:id="rId1"/>
   </p:sldMasterIdLst>
   <p:notesMasterIdLst>
-    <p:notesMasterId r:id="rId13"/>
+    <p:notesMasterId r:id="rId14"/>
   </p:notesMasterIdLst>
   <p:handoutMasterIdLst>
-    <p:handoutMasterId r:id="rId14"/>
+    <p:handoutMasterId r:id="rId15"/>
   </p:handoutMasterIdLst>
   <p:sldIdLst>
     <p:sldId id="257" r:id="rId2"/>
     <p:sldId id="261" r:id="rId3"/>
     <p:sldId id="263" r:id="rId4"/>
     <p:sldId id="272" r:id="rId5"/>
-    <p:sldId id="264" r:id="rId6"/>
-    <p:sldId id="270" r:id="rId7"/>
-    <p:sldId id="267" r:id="rId8"/>
-    <p:sldId id="266" r:id="rId9"/>
-    <p:sldId id="268" r:id="rId10"/>
-    <p:sldId id="269" r:id="rId11"/>
-    <p:sldId id="271" r:id="rId12"/>
+    <p:sldId id="273" r:id="rId6"/>
+    <p:sldId id="264" r:id="rId7"/>
+    <p:sldId id="270" r:id="rId8"/>
+    <p:sldId id="267" r:id="rId9"/>
+    <p:sldId id="266" r:id="rId10"/>
+    <p:sldId id="268" r:id="rId11"/>
+    <p:sldId id="269" r:id="rId12"/>
+    <p:sldId id="271" r:id="rId13"/>
   </p:sldIdLst>
   <p:sldSz cx="9144000" cy="6858000" type="screen4x3"/>
   <p:notesSz cx="7099300" cy="10234613"/>
@@ -4012,7 +4013,7 @@
                   </a:outerShdw>
                 </a:effectLst>
               </a:rPr>
-              <a:t>Fonctionnement API:</a:t>
+              <a:t>Fonctionnement complet:</a:t>
             </a:r>
           </a:p>
         </p:txBody>
@@ -4101,6 +4102,314 @@
               <a:rPr lang="fr-BE" smtClean="0"/>
               <a:pPr/>
               <a:t>10</a:t>
+            </a:fld>
+            <a:endParaRPr lang="fr-BE"/>
+          </a:p>
+        </p:txBody>
+      </p:sp>
+      <p:pic>
+        <p:nvPicPr>
+          <p:cNvPr id="10" name="Image 9">
+            <a:extLst>
+              <a:ext uri="{FF2B5EF4-FFF2-40B4-BE49-F238E27FC236}">
+                <a16:creationId xmlns:a16="http://schemas.microsoft.com/office/drawing/2014/main" id="{79C35690-DEF3-4EE9-B1C4-D9891C643ADF}"/>
+              </a:ext>
+            </a:extLst>
+          </p:cNvPr>
+          <p:cNvPicPr>
+            <a:picLocks noChangeAspect="1"/>
+          </p:cNvPicPr>
+          <p:nvPr/>
+        </p:nvPicPr>
+        <p:blipFill>
+          <a:blip r:embed="rId2">
+            <a:extLst>
+              <a:ext uri="{28A0092B-C50C-407E-A947-70E740481C1C}">
+                <a14:useLocalDpi xmlns:a14="http://schemas.microsoft.com/office/drawing/2010/main" val="0"/>
+              </a:ext>
+            </a:extLst>
+          </a:blip>
+          <a:stretch>
+            <a:fillRect/>
+          </a:stretch>
+        </p:blipFill>
+        <p:spPr>
+          <a:xfrm>
+            <a:off x="53752" y="2060848"/>
+            <a:ext cx="9036496" cy="3919862"/>
+          </a:xfrm>
+          <a:prstGeom prst="rect">
+            <a:avLst/>
+          </a:prstGeom>
+        </p:spPr>
+      </p:pic>
+    </p:spTree>
+    <p:extLst>
+      <p:ext uri="{BB962C8B-B14F-4D97-AF65-F5344CB8AC3E}">
+        <p14:creationId xmlns:p14="http://schemas.microsoft.com/office/powerpoint/2010/main" val="2102979741"/>
+      </p:ext>
+    </p:extLst>
+  </p:cSld>
+  <p:clrMapOvr>
+    <a:masterClrMapping/>
+  </p:clrMapOvr>
+  <p:transition spd="slow">
+    <p:cover/>
+  </p:transition>
+  <p:timing>
+    <p:tnLst>
+      <p:par>
+        <p:cTn id="1" dur="indefinite" restart="never" nodeType="tmRoot">
+          <p:childTnLst>
+            <p:seq concurrent="1" nextAc="seek">
+              <p:cTn id="2" dur="indefinite" nodeType="mainSeq">
+                <p:childTnLst>
+                  <p:par>
+                    <p:cTn id="3" fill="hold">
+                      <p:stCondLst>
+                        <p:cond delay="indefinite"/>
+                      </p:stCondLst>
+                      <p:childTnLst>
+                        <p:par>
+                          <p:cTn id="4" fill="hold">
+                            <p:stCondLst>
+                              <p:cond delay="0"/>
+                            </p:stCondLst>
+                            <p:childTnLst>
+                              <p:par>
+                                <p:cTn id="5" presetID="10" presetClass="entr" presetSubtype="0" fill="hold" nodeType="clickEffect">
+                                  <p:stCondLst>
+                                    <p:cond delay="0"/>
+                                  </p:stCondLst>
+                                  <p:childTnLst>
+                                    <p:set>
+                                      <p:cBhvr>
+                                        <p:cTn id="6" dur="1" fill="hold">
+                                          <p:stCondLst>
+                                            <p:cond delay="0"/>
+                                          </p:stCondLst>
+                                        </p:cTn>
+                                        <p:tgtEl>
+                                          <p:spTgt spid="10"/>
+                                        </p:tgtEl>
+                                        <p:attrNameLst>
+                                          <p:attrName>style.visibility</p:attrName>
+                                        </p:attrNameLst>
+                                      </p:cBhvr>
+                                      <p:to>
+                                        <p:strVal val="visible"/>
+                                      </p:to>
+                                    </p:set>
+                                    <p:animEffect transition="in" filter="fade">
+                                      <p:cBhvr>
+                                        <p:cTn id="7" dur="500"/>
+                                        <p:tgtEl>
+                                          <p:spTgt spid="10"/>
+                                        </p:tgtEl>
+                                      </p:cBhvr>
+                                    </p:animEffect>
+                                  </p:childTnLst>
+                                </p:cTn>
+                              </p:par>
+                            </p:childTnLst>
+                          </p:cTn>
+                        </p:par>
+                      </p:childTnLst>
+                    </p:cTn>
+                  </p:par>
+                </p:childTnLst>
+              </p:cTn>
+              <p:prevCondLst>
+                <p:cond evt="onPrev" delay="0">
+                  <p:tgtEl>
+                    <p:sldTgt/>
+                  </p:tgtEl>
+                </p:cond>
+              </p:prevCondLst>
+              <p:nextCondLst>
+                <p:cond evt="onNext" delay="0">
+                  <p:tgtEl>
+                    <p:sldTgt/>
+                  </p:tgtEl>
+                </p:cond>
+              </p:nextCondLst>
+            </p:seq>
+          </p:childTnLst>
+        </p:cTn>
+      </p:par>
+    </p:tnLst>
+  </p:timing>
+</p:sld>
+</file>
+
+<file path=ppt/slides/slide11.xml><?xml version="1.0" encoding="utf-8"?>
+<p:sld xmlns:a="http://schemas.openxmlformats.org/drawingml/2006/main" xmlns:r="http://schemas.openxmlformats.org/officeDocument/2006/relationships" xmlns:p="http://schemas.openxmlformats.org/presentationml/2006/main">
+  <p:cSld>
+    <p:spTree>
+      <p:nvGrpSpPr>
+        <p:cNvPr id="1" name=""/>
+        <p:cNvGrpSpPr/>
+        <p:nvPr/>
+      </p:nvGrpSpPr>
+      <p:grpSpPr>
+        <a:xfrm>
+          <a:off x="0" y="0"/>
+          <a:ext cx="0" cy="0"/>
+          <a:chOff x="0" y="0"/>
+          <a:chExt cx="0" cy="0"/>
+        </a:xfrm>
+      </p:grpSpPr>
+      <p:sp>
+        <p:nvSpPr>
+          <p:cNvPr id="2" name="Titre 1">
+            <a:extLst>
+              <a:ext uri="{FF2B5EF4-FFF2-40B4-BE49-F238E27FC236}">
+                <a16:creationId xmlns:a16="http://schemas.microsoft.com/office/drawing/2014/main" id="{3328684C-27C5-4573-8BD1-2AAF87373B35}"/>
+              </a:ext>
+            </a:extLst>
+          </p:cNvPr>
+          <p:cNvSpPr>
+            <a:spLocks noGrp="1"/>
+          </p:cNvSpPr>
+          <p:nvPr>
+            <p:ph type="title"/>
+          </p:nvPr>
+        </p:nvSpPr>
+        <p:spPr/>
+        <p:txBody>
+          <a:bodyPr/>
+          <a:lstStyle/>
+          <a:p>
+            <a:r>
+              <a:rPr lang="fr-BE" dirty="0"/>
+              <a:t>Software</a:t>
+            </a:r>
+          </a:p>
+        </p:txBody>
+      </p:sp>
+      <p:sp>
+        <p:nvSpPr>
+          <p:cNvPr id="3" name="Espace réservé du contenu 2">
+            <a:extLst>
+              <a:ext uri="{FF2B5EF4-FFF2-40B4-BE49-F238E27FC236}">
+                <a16:creationId xmlns:a16="http://schemas.microsoft.com/office/drawing/2014/main" id="{904F9E68-5055-4F80-B6A4-3B277D1A4E17}"/>
+              </a:ext>
+            </a:extLst>
+          </p:cNvPr>
+          <p:cNvSpPr>
+            <a:spLocks noGrp="1"/>
+          </p:cNvSpPr>
+          <p:nvPr>
+            <p:ph idx="1"/>
+          </p:nvPr>
+        </p:nvSpPr>
+        <p:spPr/>
+        <p:txBody>
+          <a:bodyPr/>
+          <a:lstStyle/>
+          <a:p>
+            <a:pPr marL="0" indent="0">
+              <a:buNone/>
+            </a:pPr>
+            <a:r>
+              <a:rPr lang="fr-BE" u="sng" dirty="0">
+                <a:effectLst>
+                  <a:outerShdw blurRad="38100" dist="38100" dir="2700000" algn="tl">
+                    <a:srgbClr val="000000">
+                      <a:alpha val="43137"/>
+                    </a:srgbClr>
+                  </a:outerShdw>
+                </a:effectLst>
+              </a:rPr>
+              <a:t>Fonctionnement API:</a:t>
+            </a:r>
+          </a:p>
+        </p:txBody>
+      </p:sp>
+      <p:sp>
+        <p:nvSpPr>
+          <p:cNvPr id="4" name="Espace réservé de la date 3">
+            <a:extLst>
+              <a:ext uri="{FF2B5EF4-FFF2-40B4-BE49-F238E27FC236}">
+                <a16:creationId xmlns:a16="http://schemas.microsoft.com/office/drawing/2014/main" id="{1AAF3538-66FA-45FA-91DF-389B5B7A7172}"/>
+              </a:ext>
+            </a:extLst>
+          </p:cNvPr>
+          <p:cNvSpPr>
+            <a:spLocks noGrp="1"/>
+          </p:cNvSpPr>
+          <p:nvPr>
+            <p:ph type="dt" sz="half" idx="10"/>
+          </p:nvPr>
+        </p:nvSpPr>
+        <p:spPr/>
+        <p:txBody>
+          <a:bodyPr/>
+          <a:lstStyle/>
+          <a:p>
+            <a:fld id="{7F44ED6C-F45B-4CA7-82D8-BC1E073DDDCA}" type="datetime1">
+              <a:rPr lang="fr-BE" smtClean="0"/>
+              <a:pPr/>
+              <a:t>20-01-19</a:t>
+            </a:fld>
+            <a:endParaRPr lang="fr-BE"/>
+          </a:p>
+        </p:txBody>
+      </p:sp>
+      <p:sp>
+        <p:nvSpPr>
+          <p:cNvPr id="5" name="Espace réservé du pied de page 4">
+            <a:extLst>
+              <a:ext uri="{FF2B5EF4-FFF2-40B4-BE49-F238E27FC236}">
+                <a16:creationId xmlns:a16="http://schemas.microsoft.com/office/drawing/2014/main" id="{0AC11A48-F826-44FF-9ECF-9F8BECA04C03}"/>
+              </a:ext>
+            </a:extLst>
+          </p:cNvPr>
+          <p:cNvSpPr>
+            <a:spLocks noGrp="1"/>
+          </p:cNvSpPr>
+          <p:nvPr>
+            <p:ph type="ftr" sz="quarter" idx="11"/>
+          </p:nvPr>
+        </p:nvSpPr>
+        <p:spPr/>
+        <p:txBody>
+          <a:bodyPr/>
+          <a:lstStyle/>
+          <a:p>
+            <a:r>
+              <a:rPr lang="fr-BE"/>
+              <a:t>www.heh.be</a:t>
+            </a:r>
+            <a:endParaRPr lang="fr-BE" dirty="0"/>
+          </a:p>
+        </p:txBody>
+      </p:sp>
+      <p:sp>
+        <p:nvSpPr>
+          <p:cNvPr id="6" name="Espace réservé du numéro de diapositive 5">
+            <a:extLst>
+              <a:ext uri="{FF2B5EF4-FFF2-40B4-BE49-F238E27FC236}">
+                <a16:creationId xmlns:a16="http://schemas.microsoft.com/office/drawing/2014/main" id="{BB324517-0111-4BC7-9BB4-9BCEF0E4D590}"/>
+              </a:ext>
+            </a:extLst>
+          </p:cNvPr>
+          <p:cNvSpPr>
+            <a:spLocks noGrp="1"/>
+          </p:cNvSpPr>
+          <p:nvPr>
+            <p:ph type="sldNum" sz="quarter" idx="12"/>
+          </p:nvPr>
+        </p:nvSpPr>
+        <p:spPr/>
+        <p:txBody>
+          <a:bodyPr/>
+          <a:lstStyle/>
+          <a:p>
+            <a:fld id="{F8B969FB-3CDB-4BA7-BB65-4C9B3D66EC11}" type="slidenum">
+              <a:rPr lang="fr-BE" smtClean="0"/>
+              <a:pPr/>
+              <a:t>11</a:t>
             </a:fld>
             <a:endParaRPr lang="fr-BE"/>
           </a:p>
@@ -4241,7 +4550,7 @@
 </p:sld>
 </file>
 
-<file path=ppt/slides/slide11.xml><?xml version="1.0" encoding="utf-8"?>
+<file path=ppt/slides/slide12.xml><?xml version="1.0" encoding="utf-8"?>
 <p:sld xmlns:a="http://schemas.openxmlformats.org/drawingml/2006/main" xmlns:r="http://schemas.openxmlformats.org/officeDocument/2006/relationships" xmlns:p="http://schemas.openxmlformats.org/presentationml/2006/main">
   <p:cSld>
     <p:spTree>
@@ -4382,7 +4691,7 @@
             <a:fld id="{F8B969FB-3CDB-4BA7-BB65-4C9B3D66EC11}" type="slidenum">
               <a:rPr lang="fr-BE" smtClean="0"/>
               <a:pPr/>
-              <a:t>11</a:t>
+              <a:t>12</a:t>
             </a:fld>
             <a:endParaRPr lang="fr-BE"/>
           </a:p>
@@ -4520,13 +4829,13 @@
   <p:clrMapOvr>
     <a:masterClrMapping/>
   </p:clrMapOvr>
-  <mc:AlternateContent xmlns:mc="http://schemas.openxmlformats.org/markup-compatibility/2006">
-    <mc:Choice xmlns:p14="http://schemas.microsoft.com/office/powerpoint/2010/main" Requires="p14">
+  <mc:AlternateContent xmlns:mc="http://schemas.openxmlformats.org/markup-compatibility/2006" xmlns:p14="http://schemas.microsoft.com/office/powerpoint/2010/main">
+    <mc:Choice Requires="p14">
       <p:transition spd="med" p14:dur="700">
         <p:fade/>
       </p:transition>
     </mc:Choice>
-    <mc:Fallback>
+    <mc:Fallback xmlns="">
       <p:transition spd="med">
         <p:fade/>
       </p:transition>
@@ -4941,13 +5250,13 @@
   <p:clrMapOvr>
     <a:masterClrMapping/>
   </p:clrMapOvr>
-  <mc:AlternateContent xmlns:mc="http://schemas.openxmlformats.org/markup-compatibility/2006">
-    <mc:Choice xmlns:p14="http://schemas.microsoft.com/office/powerpoint/2010/main" Requires="p14">
+  <mc:AlternateContent xmlns:mc="http://schemas.openxmlformats.org/markup-compatibility/2006" xmlns:p14="http://schemas.microsoft.com/office/powerpoint/2010/main">
+    <mc:Choice Requires="p14">
       <p:transition spd="med" p14:dur="700">
         <p:fade/>
       </p:transition>
     </mc:Choice>
-    <mc:Fallback>
+    <mc:Fallback xmlns="">
       <p:transition spd="med">
         <p:fade/>
       </p:transition>
@@ -4975,7 +5284,13 @@
       </p:grpSpPr>
       <p:sp>
         <p:nvSpPr>
-          <p:cNvPr id="2" name="Titre 1"/>
+          <p:cNvPr id="2" name="Titre 1">
+            <a:extLst>
+              <a:ext uri="{FF2B5EF4-FFF2-40B4-BE49-F238E27FC236}">
+                <a16:creationId xmlns:a16="http://schemas.microsoft.com/office/drawing/2014/main" id="{1B917D5A-823E-432E-AAEA-EF5FECE6CAD0}"/>
+              </a:ext>
+            </a:extLst>
+          </p:cNvPr>
           <p:cNvSpPr>
             <a:spLocks noGrp="1"/>
           </p:cNvSpPr>
@@ -4983,33 +5298,27 @@
             <p:ph type="title"/>
           </p:nvPr>
         </p:nvSpPr>
-        <p:spPr>
-          <a:xfrm>
-            <a:off x="722313" y="4406900"/>
-            <a:ext cx="7772400" cy="1362075"/>
-          </a:xfrm>
-        </p:spPr>
+        <p:spPr/>
         <p:txBody>
           <a:bodyPr/>
           <a:lstStyle/>
           <a:p>
             <a:r>
               <a:rPr lang="fr-BE" dirty="0"/>
-              <a:t>Fonctionnement</a:t>
-            </a:r>
-            <a:br>
-              <a:rPr lang="fr-BE" dirty="0"/>
-            </a:br>
-            <a:r>
-              <a:rPr lang="fr-BE" sz="2400" dirty="0"/>
-              <a:t>Hardware</a:t>
-            </a:r>
-          </a:p>
-        </p:txBody>
-      </p:sp>
-      <p:sp>
-        <p:nvSpPr>
-          <p:cNvPr id="4" name="Espace réservé de la date 3"/>
+              <a:t>Template Web</a:t>
+            </a:r>
+          </a:p>
+        </p:txBody>
+      </p:sp>
+      <p:sp>
+        <p:nvSpPr>
+          <p:cNvPr id="4" name="Espace réservé de la date 3">
+            <a:extLst>
+              <a:ext uri="{FF2B5EF4-FFF2-40B4-BE49-F238E27FC236}">
+                <a16:creationId xmlns:a16="http://schemas.microsoft.com/office/drawing/2014/main" id="{44539AD6-14FB-49BB-A398-A12A96EFC78E}"/>
+              </a:ext>
+            </a:extLst>
+          </p:cNvPr>
           <p:cNvSpPr>
             <a:spLocks noGrp="1"/>
           </p:cNvSpPr>
@@ -5022,40 +5331,53 @@
           <a:bodyPr/>
           <a:lstStyle/>
           <a:p>
-            <a:fld id="{247BEEBC-1960-4B40-834F-586131B91DBA}" type="datetime1">
+            <a:fld id="{7F44ED6C-F45B-4CA7-82D8-BC1E073DDDCA}" type="datetime1">
               <a:rPr lang="fr-BE" smtClean="0"/>
               <a:pPr/>
               <a:t>20-01-19</a:t>
             </a:fld>
+            <a:endParaRPr lang="fr-BE"/>
+          </a:p>
+        </p:txBody>
+      </p:sp>
+      <p:sp>
+        <p:nvSpPr>
+          <p:cNvPr id="5" name="Espace réservé du pied de page 4">
+            <a:extLst>
+              <a:ext uri="{FF2B5EF4-FFF2-40B4-BE49-F238E27FC236}">
+                <a16:creationId xmlns:a16="http://schemas.microsoft.com/office/drawing/2014/main" id="{0B5FA403-17D9-4576-8BF9-5C045317F38B}"/>
+              </a:ext>
+            </a:extLst>
+          </p:cNvPr>
+          <p:cNvSpPr>
+            <a:spLocks noGrp="1"/>
+          </p:cNvSpPr>
+          <p:nvPr>
+            <p:ph type="ftr" sz="quarter" idx="11"/>
+          </p:nvPr>
+        </p:nvSpPr>
+        <p:spPr/>
+        <p:txBody>
+          <a:bodyPr/>
+          <a:lstStyle/>
+          <a:p>
+            <a:r>
+              <a:rPr lang="fr-BE"/>
+              <a:t>www.heh.be</a:t>
+            </a:r>
             <a:endParaRPr lang="fr-BE" dirty="0"/>
           </a:p>
         </p:txBody>
       </p:sp>
       <p:sp>
         <p:nvSpPr>
-          <p:cNvPr id="5" name="Espace réservé du pied de page 4"/>
-          <p:cNvSpPr>
-            <a:spLocks noGrp="1"/>
-          </p:cNvSpPr>
-          <p:nvPr>
-            <p:ph type="ftr" sz="quarter" idx="11"/>
-          </p:nvPr>
-        </p:nvSpPr>
-        <p:spPr/>
-        <p:txBody>
-          <a:bodyPr/>
-          <a:lstStyle/>
-          <a:p>
-            <a:r>
-              <a:rPr lang="fr-BE" dirty="0"/>
-              <a:t>www.heh.be</a:t>
-            </a:r>
-          </a:p>
-        </p:txBody>
-      </p:sp>
-      <p:sp>
-        <p:nvSpPr>
-          <p:cNvPr id="6" name="Espace réservé du numéro de diapositive 5"/>
+          <p:cNvPr id="6" name="Espace réservé du numéro de diapositive 5">
+            <a:extLst>
+              <a:ext uri="{FF2B5EF4-FFF2-40B4-BE49-F238E27FC236}">
+                <a16:creationId xmlns:a16="http://schemas.microsoft.com/office/drawing/2014/main" id="{CDFC7354-82F2-41BC-9D41-49755556ADBA}"/>
+              </a:ext>
+            </a:extLst>
+          </p:cNvPr>
           <p:cNvSpPr>
             <a:spLocks noGrp="1"/>
           </p:cNvSpPr>
@@ -5073,32 +5395,45 @@
               <a:pPr/>
               <a:t>5</a:t>
             </a:fld>
-            <a:endParaRPr lang="fr-BE" dirty="0"/>
+            <a:endParaRPr lang="fr-BE"/>
+          </a:p>
+        </p:txBody>
+      </p:sp>
+      <p:sp>
+        <p:nvSpPr>
+          <p:cNvPr id="9" name="Espace réservé du contenu 8">
+            <a:extLst>
+              <a:ext uri="{FF2B5EF4-FFF2-40B4-BE49-F238E27FC236}">
+                <a16:creationId xmlns:a16="http://schemas.microsoft.com/office/drawing/2014/main" id="{C08B0D8A-7510-4E95-AFA1-866A28BED061}"/>
+              </a:ext>
+            </a:extLst>
+          </p:cNvPr>
+          <p:cNvSpPr>
+            <a:spLocks noGrp="1"/>
+          </p:cNvSpPr>
+          <p:nvPr>
+            <p:ph idx="1"/>
+          </p:nvPr>
+        </p:nvSpPr>
+        <p:spPr/>
+        <p:txBody>
+          <a:bodyPr/>
+          <a:lstStyle/>
+          <a:p>
+            <a:endParaRPr lang="fr-BE"/>
           </a:p>
         </p:txBody>
       </p:sp>
     </p:spTree>
     <p:extLst>
       <p:ext uri="{BB962C8B-B14F-4D97-AF65-F5344CB8AC3E}">
-        <p14:creationId xmlns:p14="http://schemas.microsoft.com/office/powerpoint/2010/main" val="1833672221"/>
+        <p14:creationId xmlns:p14="http://schemas.microsoft.com/office/powerpoint/2010/main" val="2497645882"/>
       </p:ext>
     </p:extLst>
   </p:cSld>
   <p:clrMapOvr>
     <a:masterClrMapping/>
   </p:clrMapOvr>
-  <mc:AlternateContent xmlns:mc="http://schemas.openxmlformats.org/markup-compatibility/2006">
-    <mc:Choice xmlns:p14="http://schemas.microsoft.com/office/powerpoint/2010/main" Requires="p14">
-      <p:transition spd="med" p14:dur="700">
-        <p:fade/>
-      </p:transition>
-    </mc:Choice>
-    <mc:Fallback>
-      <p:transition spd="med">
-        <p:fade/>
-      </p:transition>
-    </mc:Fallback>
-  </mc:AlternateContent>
 </p:sld>
 </file>
 
@@ -5121,6 +5456,152 @@
       </p:grpSpPr>
       <p:sp>
         <p:nvSpPr>
+          <p:cNvPr id="2" name="Titre 1"/>
+          <p:cNvSpPr>
+            <a:spLocks noGrp="1"/>
+          </p:cNvSpPr>
+          <p:nvPr>
+            <p:ph type="title"/>
+          </p:nvPr>
+        </p:nvSpPr>
+        <p:spPr>
+          <a:xfrm>
+            <a:off x="722313" y="4406900"/>
+            <a:ext cx="7772400" cy="1362075"/>
+          </a:xfrm>
+        </p:spPr>
+        <p:txBody>
+          <a:bodyPr/>
+          <a:lstStyle/>
+          <a:p>
+            <a:r>
+              <a:rPr lang="fr-BE" dirty="0"/>
+              <a:t>Fonctionnement</a:t>
+            </a:r>
+            <a:br>
+              <a:rPr lang="fr-BE" dirty="0"/>
+            </a:br>
+            <a:r>
+              <a:rPr lang="fr-BE" sz="2400" dirty="0"/>
+              <a:t>Hardware</a:t>
+            </a:r>
+          </a:p>
+        </p:txBody>
+      </p:sp>
+      <p:sp>
+        <p:nvSpPr>
+          <p:cNvPr id="4" name="Espace réservé de la date 3"/>
+          <p:cNvSpPr>
+            <a:spLocks noGrp="1"/>
+          </p:cNvSpPr>
+          <p:nvPr>
+            <p:ph type="dt" sz="half" idx="10"/>
+          </p:nvPr>
+        </p:nvSpPr>
+        <p:spPr/>
+        <p:txBody>
+          <a:bodyPr/>
+          <a:lstStyle/>
+          <a:p>
+            <a:fld id="{247BEEBC-1960-4B40-834F-586131B91DBA}" type="datetime1">
+              <a:rPr lang="fr-BE" smtClean="0"/>
+              <a:pPr/>
+              <a:t>20-01-19</a:t>
+            </a:fld>
+            <a:endParaRPr lang="fr-BE" dirty="0"/>
+          </a:p>
+        </p:txBody>
+      </p:sp>
+      <p:sp>
+        <p:nvSpPr>
+          <p:cNvPr id="5" name="Espace réservé du pied de page 4"/>
+          <p:cNvSpPr>
+            <a:spLocks noGrp="1"/>
+          </p:cNvSpPr>
+          <p:nvPr>
+            <p:ph type="ftr" sz="quarter" idx="11"/>
+          </p:nvPr>
+        </p:nvSpPr>
+        <p:spPr/>
+        <p:txBody>
+          <a:bodyPr/>
+          <a:lstStyle/>
+          <a:p>
+            <a:r>
+              <a:rPr lang="fr-BE" dirty="0"/>
+              <a:t>www.heh.be</a:t>
+            </a:r>
+          </a:p>
+        </p:txBody>
+      </p:sp>
+      <p:sp>
+        <p:nvSpPr>
+          <p:cNvPr id="6" name="Espace réservé du numéro de diapositive 5"/>
+          <p:cNvSpPr>
+            <a:spLocks noGrp="1"/>
+          </p:cNvSpPr>
+          <p:nvPr>
+            <p:ph type="sldNum" sz="quarter" idx="12"/>
+          </p:nvPr>
+        </p:nvSpPr>
+        <p:spPr/>
+        <p:txBody>
+          <a:bodyPr/>
+          <a:lstStyle/>
+          <a:p>
+            <a:fld id="{F8B969FB-3CDB-4BA7-BB65-4C9B3D66EC11}" type="slidenum">
+              <a:rPr lang="fr-BE" smtClean="0"/>
+              <a:pPr/>
+              <a:t>6</a:t>
+            </a:fld>
+            <a:endParaRPr lang="fr-BE" dirty="0"/>
+          </a:p>
+        </p:txBody>
+      </p:sp>
+    </p:spTree>
+    <p:extLst>
+      <p:ext uri="{BB962C8B-B14F-4D97-AF65-F5344CB8AC3E}">
+        <p14:creationId xmlns:p14="http://schemas.microsoft.com/office/powerpoint/2010/main" val="1833672221"/>
+      </p:ext>
+    </p:extLst>
+  </p:cSld>
+  <p:clrMapOvr>
+    <a:masterClrMapping/>
+  </p:clrMapOvr>
+  <mc:AlternateContent xmlns:mc="http://schemas.openxmlformats.org/markup-compatibility/2006" xmlns:p14="http://schemas.microsoft.com/office/powerpoint/2010/main">
+    <mc:Choice Requires="p14">
+      <p:transition spd="med" p14:dur="700">
+        <p:fade/>
+      </p:transition>
+    </mc:Choice>
+    <mc:Fallback xmlns="">
+      <p:transition spd="med">
+        <p:fade/>
+      </p:transition>
+    </mc:Fallback>
+  </mc:AlternateContent>
+</p:sld>
+</file>
+
+<file path=ppt/slides/slide7.xml><?xml version="1.0" encoding="utf-8"?>
+<p:sld xmlns:a="http://schemas.openxmlformats.org/drawingml/2006/main" xmlns:r="http://schemas.openxmlformats.org/officeDocument/2006/relationships" xmlns:p="http://schemas.openxmlformats.org/presentationml/2006/main">
+  <p:cSld>
+    <p:spTree>
+      <p:nvGrpSpPr>
+        <p:cNvPr id="1" name=""/>
+        <p:cNvGrpSpPr/>
+        <p:nvPr/>
+      </p:nvGrpSpPr>
+      <p:grpSpPr>
+        <a:xfrm>
+          <a:off x="0" y="0"/>
+          <a:ext cx="0" cy="0"/>
+          <a:chOff x="0" y="0"/>
+          <a:chExt cx="0" cy="0"/>
+        </a:xfrm>
+      </p:grpSpPr>
+      <p:sp>
+        <p:nvSpPr>
           <p:cNvPr id="2" name="Titre 1">
             <a:extLst>
               <a:ext uri="{FF2B5EF4-FFF2-40B4-BE49-F238E27FC236}">
@@ -5448,7 +5929,7 @@
             <a:fld id="{F8B969FB-3CDB-4BA7-BB65-4C9B3D66EC11}" type="slidenum">
               <a:rPr lang="fr-BE" smtClean="0"/>
               <a:pPr/>
-              <a:t>6</a:t>
+              <a:t>7</a:t>
             </a:fld>
             <a:endParaRPr lang="fr-BE"/>
           </a:p>
@@ -6301,153 +6782,6 @@
 </p:sld>
 </file>
 
-<file path=ppt/slides/slide7.xml><?xml version="1.0" encoding="utf-8"?>
-<p:sld xmlns:a="http://schemas.openxmlformats.org/drawingml/2006/main" xmlns:r="http://schemas.openxmlformats.org/officeDocument/2006/relationships" xmlns:p="http://schemas.openxmlformats.org/presentationml/2006/main">
-  <p:cSld>
-    <p:spTree>
-      <p:nvGrpSpPr>
-        <p:cNvPr id="1" name=""/>
-        <p:cNvGrpSpPr/>
-        <p:nvPr/>
-      </p:nvGrpSpPr>
-      <p:grpSpPr>
-        <a:xfrm>
-          <a:off x="0" y="0"/>
-          <a:ext cx="0" cy="0"/>
-          <a:chOff x="0" y="0"/>
-          <a:chExt cx="0" cy="0"/>
-        </a:xfrm>
-      </p:grpSpPr>
-      <p:sp>
-        <p:nvSpPr>
-          <p:cNvPr id="2" name="Titre 1"/>
-          <p:cNvSpPr>
-            <a:spLocks noGrp="1"/>
-          </p:cNvSpPr>
-          <p:nvPr>
-            <p:ph type="title"/>
-          </p:nvPr>
-        </p:nvSpPr>
-        <p:spPr>
-          <a:xfrm>
-            <a:off x="722313" y="4406900"/>
-            <a:ext cx="7772400" cy="1362075"/>
-          </a:xfrm>
-        </p:spPr>
-        <p:txBody>
-          <a:bodyPr/>
-          <a:lstStyle/>
-          <a:p>
-            <a:r>
-              <a:rPr lang="fr-BE" dirty="0"/>
-              <a:t>Fonctionnement</a:t>
-            </a:r>
-            <a:br>
-              <a:rPr lang="fr-BE" dirty="0"/>
-            </a:br>
-            <a:r>
-              <a:rPr lang="fr-BE" sz="2400" dirty="0" err="1"/>
-              <a:t>SoftWare</a:t>
-            </a:r>
-            <a:endParaRPr lang="fr-BE" sz="2400" dirty="0"/>
-          </a:p>
-        </p:txBody>
-      </p:sp>
-      <p:sp>
-        <p:nvSpPr>
-          <p:cNvPr id="4" name="Espace réservé de la date 3"/>
-          <p:cNvSpPr>
-            <a:spLocks noGrp="1"/>
-          </p:cNvSpPr>
-          <p:nvPr>
-            <p:ph type="dt" sz="half" idx="10"/>
-          </p:nvPr>
-        </p:nvSpPr>
-        <p:spPr/>
-        <p:txBody>
-          <a:bodyPr/>
-          <a:lstStyle/>
-          <a:p>
-            <a:fld id="{247BEEBC-1960-4B40-834F-586131B91DBA}" type="datetime1">
-              <a:rPr lang="fr-BE" smtClean="0"/>
-              <a:pPr/>
-              <a:t>20-01-19</a:t>
-            </a:fld>
-            <a:endParaRPr lang="fr-BE" dirty="0"/>
-          </a:p>
-        </p:txBody>
-      </p:sp>
-      <p:sp>
-        <p:nvSpPr>
-          <p:cNvPr id="5" name="Espace réservé du pied de page 4"/>
-          <p:cNvSpPr>
-            <a:spLocks noGrp="1"/>
-          </p:cNvSpPr>
-          <p:nvPr>
-            <p:ph type="ftr" sz="quarter" idx="11"/>
-          </p:nvPr>
-        </p:nvSpPr>
-        <p:spPr/>
-        <p:txBody>
-          <a:bodyPr/>
-          <a:lstStyle/>
-          <a:p>
-            <a:r>
-              <a:rPr lang="fr-BE" dirty="0"/>
-              <a:t>www.heh.be</a:t>
-            </a:r>
-          </a:p>
-        </p:txBody>
-      </p:sp>
-      <p:sp>
-        <p:nvSpPr>
-          <p:cNvPr id="6" name="Espace réservé du numéro de diapositive 5"/>
-          <p:cNvSpPr>
-            <a:spLocks noGrp="1"/>
-          </p:cNvSpPr>
-          <p:nvPr>
-            <p:ph type="sldNum" sz="quarter" idx="12"/>
-          </p:nvPr>
-        </p:nvSpPr>
-        <p:spPr/>
-        <p:txBody>
-          <a:bodyPr/>
-          <a:lstStyle/>
-          <a:p>
-            <a:fld id="{F8B969FB-3CDB-4BA7-BB65-4C9B3D66EC11}" type="slidenum">
-              <a:rPr lang="fr-BE" smtClean="0"/>
-              <a:pPr/>
-              <a:t>7</a:t>
-            </a:fld>
-            <a:endParaRPr lang="fr-BE" dirty="0"/>
-          </a:p>
-        </p:txBody>
-      </p:sp>
-    </p:spTree>
-    <p:extLst>
-      <p:ext uri="{BB962C8B-B14F-4D97-AF65-F5344CB8AC3E}">
-        <p14:creationId xmlns:p14="http://schemas.microsoft.com/office/powerpoint/2010/main" val="4242322027"/>
-      </p:ext>
-    </p:extLst>
-  </p:cSld>
-  <p:clrMapOvr>
-    <a:masterClrMapping/>
-  </p:clrMapOvr>
-  <mc:AlternateContent xmlns:mc="http://schemas.openxmlformats.org/markup-compatibility/2006">
-    <mc:Choice xmlns:p14="http://schemas.microsoft.com/office/powerpoint/2010/main" Requires="p14">
-      <p:transition spd="med" p14:dur="700">
-        <p:fade/>
-      </p:transition>
-    </mc:Choice>
-    <mc:Fallback>
-      <p:transition spd="med">
-        <p:fade/>
-      </p:transition>
-    </mc:Fallback>
-  </mc:AlternateContent>
-</p:sld>
-</file>
-
 <file path=ppt/slides/slide8.xml><?xml version="1.0" encoding="utf-8"?>
 <p:sld xmlns:a="http://schemas.openxmlformats.org/drawingml/2006/main" xmlns:r="http://schemas.openxmlformats.org/officeDocument/2006/relationships" xmlns:p="http://schemas.openxmlformats.org/presentationml/2006/main">
   <p:cSld>
@@ -6467,6 +6801,153 @@
       </p:grpSpPr>
       <p:sp>
         <p:nvSpPr>
+          <p:cNvPr id="2" name="Titre 1"/>
+          <p:cNvSpPr>
+            <a:spLocks noGrp="1"/>
+          </p:cNvSpPr>
+          <p:nvPr>
+            <p:ph type="title"/>
+          </p:nvPr>
+        </p:nvSpPr>
+        <p:spPr>
+          <a:xfrm>
+            <a:off x="722313" y="4406900"/>
+            <a:ext cx="7772400" cy="1362075"/>
+          </a:xfrm>
+        </p:spPr>
+        <p:txBody>
+          <a:bodyPr/>
+          <a:lstStyle/>
+          <a:p>
+            <a:r>
+              <a:rPr lang="fr-BE" dirty="0"/>
+              <a:t>Fonctionnement</a:t>
+            </a:r>
+            <a:br>
+              <a:rPr lang="fr-BE" dirty="0"/>
+            </a:br>
+            <a:r>
+              <a:rPr lang="fr-BE" sz="2400" dirty="0" err="1"/>
+              <a:t>SoftWare</a:t>
+            </a:r>
+            <a:endParaRPr lang="fr-BE" sz="2400" dirty="0"/>
+          </a:p>
+        </p:txBody>
+      </p:sp>
+      <p:sp>
+        <p:nvSpPr>
+          <p:cNvPr id="4" name="Espace réservé de la date 3"/>
+          <p:cNvSpPr>
+            <a:spLocks noGrp="1"/>
+          </p:cNvSpPr>
+          <p:nvPr>
+            <p:ph type="dt" sz="half" idx="10"/>
+          </p:nvPr>
+        </p:nvSpPr>
+        <p:spPr/>
+        <p:txBody>
+          <a:bodyPr/>
+          <a:lstStyle/>
+          <a:p>
+            <a:fld id="{247BEEBC-1960-4B40-834F-586131B91DBA}" type="datetime1">
+              <a:rPr lang="fr-BE" smtClean="0"/>
+              <a:pPr/>
+              <a:t>20-01-19</a:t>
+            </a:fld>
+            <a:endParaRPr lang="fr-BE" dirty="0"/>
+          </a:p>
+        </p:txBody>
+      </p:sp>
+      <p:sp>
+        <p:nvSpPr>
+          <p:cNvPr id="5" name="Espace réservé du pied de page 4"/>
+          <p:cNvSpPr>
+            <a:spLocks noGrp="1"/>
+          </p:cNvSpPr>
+          <p:nvPr>
+            <p:ph type="ftr" sz="quarter" idx="11"/>
+          </p:nvPr>
+        </p:nvSpPr>
+        <p:spPr/>
+        <p:txBody>
+          <a:bodyPr/>
+          <a:lstStyle/>
+          <a:p>
+            <a:r>
+              <a:rPr lang="fr-BE" dirty="0"/>
+              <a:t>www.heh.be</a:t>
+            </a:r>
+          </a:p>
+        </p:txBody>
+      </p:sp>
+      <p:sp>
+        <p:nvSpPr>
+          <p:cNvPr id="6" name="Espace réservé du numéro de diapositive 5"/>
+          <p:cNvSpPr>
+            <a:spLocks noGrp="1"/>
+          </p:cNvSpPr>
+          <p:nvPr>
+            <p:ph type="sldNum" sz="quarter" idx="12"/>
+          </p:nvPr>
+        </p:nvSpPr>
+        <p:spPr/>
+        <p:txBody>
+          <a:bodyPr/>
+          <a:lstStyle/>
+          <a:p>
+            <a:fld id="{F8B969FB-3CDB-4BA7-BB65-4C9B3D66EC11}" type="slidenum">
+              <a:rPr lang="fr-BE" smtClean="0"/>
+              <a:pPr/>
+              <a:t>8</a:t>
+            </a:fld>
+            <a:endParaRPr lang="fr-BE" dirty="0"/>
+          </a:p>
+        </p:txBody>
+      </p:sp>
+    </p:spTree>
+    <p:extLst>
+      <p:ext uri="{BB962C8B-B14F-4D97-AF65-F5344CB8AC3E}">
+        <p14:creationId xmlns:p14="http://schemas.microsoft.com/office/powerpoint/2010/main" val="4242322027"/>
+      </p:ext>
+    </p:extLst>
+  </p:cSld>
+  <p:clrMapOvr>
+    <a:masterClrMapping/>
+  </p:clrMapOvr>
+  <mc:AlternateContent xmlns:mc="http://schemas.openxmlformats.org/markup-compatibility/2006" xmlns:p14="http://schemas.microsoft.com/office/powerpoint/2010/main">
+    <mc:Choice Requires="p14">
+      <p:transition spd="med" p14:dur="700">
+        <p:fade/>
+      </p:transition>
+    </mc:Choice>
+    <mc:Fallback xmlns="">
+      <p:transition spd="med">
+        <p:fade/>
+      </p:transition>
+    </mc:Fallback>
+  </mc:AlternateContent>
+</p:sld>
+</file>
+
+<file path=ppt/slides/slide9.xml><?xml version="1.0" encoding="utf-8"?>
+<p:sld xmlns:a="http://schemas.openxmlformats.org/drawingml/2006/main" xmlns:r="http://schemas.openxmlformats.org/officeDocument/2006/relationships" xmlns:p="http://schemas.openxmlformats.org/presentationml/2006/main">
+  <p:cSld>
+    <p:spTree>
+      <p:nvGrpSpPr>
+        <p:cNvPr id="1" name=""/>
+        <p:cNvGrpSpPr/>
+        <p:nvPr/>
+      </p:nvGrpSpPr>
+      <p:grpSpPr>
+        <a:xfrm>
+          <a:off x="0" y="0"/>
+          <a:ext cx="0" cy="0"/>
+          <a:chOff x="0" y="0"/>
+          <a:chExt cx="0" cy="0"/>
+        </a:xfrm>
+      </p:grpSpPr>
+      <p:sp>
+        <p:nvSpPr>
           <p:cNvPr id="2" name="Titre 1">
             <a:extLst>
               <a:ext uri="{FF2B5EF4-FFF2-40B4-BE49-F238E27FC236}">
@@ -6615,7 +7096,7 @@
             <a:fld id="{F8B969FB-3CDB-4BA7-BB65-4C9B3D66EC11}" type="slidenum">
               <a:rPr lang="fr-BE" smtClean="0"/>
               <a:pPr/>
-              <a:t>8</a:t>
+              <a:t>9</a:t>
             </a:fld>
             <a:endParaRPr lang="fr-BE"/>
           </a:p>
@@ -6719,314 +7200,6 @@
                                         <p:cTn id="7" dur="500"/>
                                         <p:tgtEl>
                                           <p:spTgt spid="8"/>
-                                        </p:tgtEl>
-                                      </p:cBhvr>
-                                    </p:animEffect>
-                                  </p:childTnLst>
-                                </p:cTn>
-                              </p:par>
-                            </p:childTnLst>
-                          </p:cTn>
-                        </p:par>
-                      </p:childTnLst>
-                    </p:cTn>
-                  </p:par>
-                </p:childTnLst>
-              </p:cTn>
-              <p:prevCondLst>
-                <p:cond evt="onPrev" delay="0">
-                  <p:tgtEl>
-                    <p:sldTgt/>
-                  </p:tgtEl>
-                </p:cond>
-              </p:prevCondLst>
-              <p:nextCondLst>
-                <p:cond evt="onNext" delay="0">
-                  <p:tgtEl>
-                    <p:sldTgt/>
-                  </p:tgtEl>
-                </p:cond>
-              </p:nextCondLst>
-            </p:seq>
-          </p:childTnLst>
-        </p:cTn>
-      </p:par>
-    </p:tnLst>
-  </p:timing>
-</p:sld>
-</file>
-
-<file path=ppt/slides/slide9.xml><?xml version="1.0" encoding="utf-8"?>
-<p:sld xmlns:a="http://schemas.openxmlformats.org/drawingml/2006/main" xmlns:r="http://schemas.openxmlformats.org/officeDocument/2006/relationships" xmlns:p="http://schemas.openxmlformats.org/presentationml/2006/main">
-  <p:cSld>
-    <p:spTree>
-      <p:nvGrpSpPr>
-        <p:cNvPr id="1" name=""/>
-        <p:cNvGrpSpPr/>
-        <p:nvPr/>
-      </p:nvGrpSpPr>
-      <p:grpSpPr>
-        <a:xfrm>
-          <a:off x="0" y="0"/>
-          <a:ext cx="0" cy="0"/>
-          <a:chOff x="0" y="0"/>
-          <a:chExt cx="0" cy="0"/>
-        </a:xfrm>
-      </p:grpSpPr>
-      <p:sp>
-        <p:nvSpPr>
-          <p:cNvPr id="2" name="Titre 1">
-            <a:extLst>
-              <a:ext uri="{FF2B5EF4-FFF2-40B4-BE49-F238E27FC236}">
-                <a16:creationId xmlns:a16="http://schemas.microsoft.com/office/drawing/2014/main" id="{3328684C-27C5-4573-8BD1-2AAF87373B35}"/>
-              </a:ext>
-            </a:extLst>
-          </p:cNvPr>
-          <p:cNvSpPr>
-            <a:spLocks noGrp="1"/>
-          </p:cNvSpPr>
-          <p:nvPr>
-            <p:ph type="title"/>
-          </p:nvPr>
-        </p:nvSpPr>
-        <p:spPr/>
-        <p:txBody>
-          <a:bodyPr/>
-          <a:lstStyle/>
-          <a:p>
-            <a:r>
-              <a:rPr lang="fr-BE" dirty="0"/>
-              <a:t>Software</a:t>
-            </a:r>
-          </a:p>
-        </p:txBody>
-      </p:sp>
-      <p:sp>
-        <p:nvSpPr>
-          <p:cNvPr id="3" name="Espace réservé du contenu 2">
-            <a:extLst>
-              <a:ext uri="{FF2B5EF4-FFF2-40B4-BE49-F238E27FC236}">
-                <a16:creationId xmlns:a16="http://schemas.microsoft.com/office/drawing/2014/main" id="{904F9E68-5055-4F80-B6A4-3B277D1A4E17}"/>
-              </a:ext>
-            </a:extLst>
-          </p:cNvPr>
-          <p:cNvSpPr>
-            <a:spLocks noGrp="1"/>
-          </p:cNvSpPr>
-          <p:nvPr>
-            <p:ph idx="1"/>
-          </p:nvPr>
-        </p:nvSpPr>
-        <p:spPr/>
-        <p:txBody>
-          <a:bodyPr/>
-          <a:lstStyle/>
-          <a:p>
-            <a:pPr marL="0" indent="0">
-              <a:buNone/>
-            </a:pPr>
-            <a:r>
-              <a:rPr lang="fr-BE" u="sng" dirty="0">
-                <a:effectLst>
-                  <a:outerShdw blurRad="38100" dist="38100" dir="2700000" algn="tl">
-                    <a:srgbClr val="000000">
-                      <a:alpha val="43137"/>
-                    </a:srgbClr>
-                  </a:outerShdw>
-                </a:effectLst>
-              </a:rPr>
-              <a:t>Fonctionnement complet:</a:t>
-            </a:r>
-          </a:p>
-        </p:txBody>
-      </p:sp>
-      <p:sp>
-        <p:nvSpPr>
-          <p:cNvPr id="4" name="Espace réservé de la date 3">
-            <a:extLst>
-              <a:ext uri="{FF2B5EF4-FFF2-40B4-BE49-F238E27FC236}">
-                <a16:creationId xmlns:a16="http://schemas.microsoft.com/office/drawing/2014/main" id="{1AAF3538-66FA-45FA-91DF-389B5B7A7172}"/>
-              </a:ext>
-            </a:extLst>
-          </p:cNvPr>
-          <p:cNvSpPr>
-            <a:spLocks noGrp="1"/>
-          </p:cNvSpPr>
-          <p:nvPr>
-            <p:ph type="dt" sz="half" idx="10"/>
-          </p:nvPr>
-        </p:nvSpPr>
-        <p:spPr/>
-        <p:txBody>
-          <a:bodyPr/>
-          <a:lstStyle/>
-          <a:p>
-            <a:fld id="{7F44ED6C-F45B-4CA7-82D8-BC1E073DDDCA}" type="datetime1">
-              <a:rPr lang="fr-BE" smtClean="0"/>
-              <a:pPr/>
-              <a:t>20-01-19</a:t>
-            </a:fld>
-            <a:endParaRPr lang="fr-BE"/>
-          </a:p>
-        </p:txBody>
-      </p:sp>
-      <p:sp>
-        <p:nvSpPr>
-          <p:cNvPr id="5" name="Espace réservé du pied de page 4">
-            <a:extLst>
-              <a:ext uri="{FF2B5EF4-FFF2-40B4-BE49-F238E27FC236}">
-                <a16:creationId xmlns:a16="http://schemas.microsoft.com/office/drawing/2014/main" id="{0AC11A48-F826-44FF-9ECF-9F8BECA04C03}"/>
-              </a:ext>
-            </a:extLst>
-          </p:cNvPr>
-          <p:cNvSpPr>
-            <a:spLocks noGrp="1"/>
-          </p:cNvSpPr>
-          <p:nvPr>
-            <p:ph type="ftr" sz="quarter" idx="11"/>
-          </p:nvPr>
-        </p:nvSpPr>
-        <p:spPr/>
-        <p:txBody>
-          <a:bodyPr/>
-          <a:lstStyle/>
-          <a:p>
-            <a:r>
-              <a:rPr lang="fr-BE"/>
-              <a:t>www.heh.be</a:t>
-            </a:r>
-            <a:endParaRPr lang="fr-BE" dirty="0"/>
-          </a:p>
-        </p:txBody>
-      </p:sp>
-      <p:sp>
-        <p:nvSpPr>
-          <p:cNvPr id="6" name="Espace réservé du numéro de diapositive 5">
-            <a:extLst>
-              <a:ext uri="{FF2B5EF4-FFF2-40B4-BE49-F238E27FC236}">
-                <a16:creationId xmlns:a16="http://schemas.microsoft.com/office/drawing/2014/main" id="{BB324517-0111-4BC7-9BB4-9BCEF0E4D590}"/>
-              </a:ext>
-            </a:extLst>
-          </p:cNvPr>
-          <p:cNvSpPr>
-            <a:spLocks noGrp="1"/>
-          </p:cNvSpPr>
-          <p:nvPr>
-            <p:ph type="sldNum" sz="quarter" idx="12"/>
-          </p:nvPr>
-        </p:nvSpPr>
-        <p:spPr/>
-        <p:txBody>
-          <a:bodyPr/>
-          <a:lstStyle/>
-          <a:p>
-            <a:fld id="{F8B969FB-3CDB-4BA7-BB65-4C9B3D66EC11}" type="slidenum">
-              <a:rPr lang="fr-BE" smtClean="0"/>
-              <a:pPr/>
-              <a:t>9</a:t>
-            </a:fld>
-            <a:endParaRPr lang="fr-BE"/>
-          </a:p>
-        </p:txBody>
-      </p:sp>
-      <p:pic>
-        <p:nvPicPr>
-          <p:cNvPr id="10" name="Image 9">
-            <a:extLst>
-              <a:ext uri="{FF2B5EF4-FFF2-40B4-BE49-F238E27FC236}">
-                <a16:creationId xmlns:a16="http://schemas.microsoft.com/office/drawing/2014/main" id="{79C35690-DEF3-4EE9-B1C4-D9891C643ADF}"/>
-              </a:ext>
-            </a:extLst>
-          </p:cNvPr>
-          <p:cNvPicPr>
-            <a:picLocks noChangeAspect="1"/>
-          </p:cNvPicPr>
-          <p:nvPr/>
-        </p:nvPicPr>
-        <p:blipFill>
-          <a:blip r:embed="rId2">
-            <a:extLst>
-              <a:ext uri="{28A0092B-C50C-407E-A947-70E740481C1C}">
-                <a14:useLocalDpi xmlns:a14="http://schemas.microsoft.com/office/drawing/2010/main" val="0"/>
-              </a:ext>
-            </a:extLst>
-          </a:blip>
-          <a:stretch>
-            <a:fillRect/>
-          </a:stretch>
-        </p:blipFill>
-        <p:spPr>
-          <a:xfrm>
-            <a:off x="53752" y="2060848"/>
-            <a:ext cx="9036496" cy="3919862"/>
-          </a:xfrm>
-          <a:prstGeom prst="rect">
-            <a:avLst/>
-          </a:prstGeom>
-        </p:spPr>
-      </p:pic>
-    </p:spTree>
-    <p:extLst>
-      <p:ext uri="{BB962C8B-B14F-4D97-AF65-F5344CB8AC3E}">
-        <p14:creationId xmlns:p14="http://schemas.microsoft.com/office/powerpoint/2010/main" val="2102979741"/>
-      </p:ext>
-    </p:extLst>
-  </p:cSld>
-  <p:clrMapOvr>
-    <a:masterClrMapping/>
-  </p:clrMapOvr>
-  <p:transition spd="slow">
-    <p:cover/>
-  </p:transition>
-  <p:timing>
-    <p:tnLst>
-      <p:par>
-        <p:cTn id="1" dur="indefinite" restart="never" nodeType="tmRoot">
-          <p:childTnLst>
-            <p:seq concurrent="1" nextAc="seek">
-              <p:cTn id="2" dur="indefinite" nodeType="mainSeq">
-                <p:childTnLst>
-                  <p:par>
-                    <p:cTn id="3" fill="hold">
-                      <p:stCondLst>
-                        <p:cond delay="indefinite"/>
-                      </p:stCondLst>
-                      <p:childTnLst>
-                        <p:par>
-                          <p:cTn id="4" fill="hold">
-                            <p:stCondLst>
-                              <p:cond delay="0"/>
-                            </p:stCondLst>
-                            <p:childTnLst>
-                              <p:par>
-                                <p:cTn id="5" presetID="10" presetClass="entr" presetSubtype="0" fill="hold" nodeType="clickEffect">
-                                  <p:stCondLst>
-                                    <p:cond delay="0"/>
-                                  </p:stCondLst>
-                                  <p:childTnLst>
-                                    <p:set>
-                                      <p:cBhvr>
-                                        <p:cTn id="6" dur="1" fill="hold">
-                                          <p:stCondLst>
-                                            <p:cond delay="0"/>
-                                          </p:stCondLst>
-                                        </p:cTn>
-                                        <p:tgtEl>
-                                          <p:spTgt spid="10"/>
-                                        </p:tgtEl>
-                                        <p:attrNameLst>
-                                          <p:attrName>style.visibility</p:attrName>
-                                        </p:attrNameLst>
-                                      </p:cBhvr>
-                                      <p:to>
-                                        <p:strVal val="visible"/>
-                                      </p:to>
-                                    </p:set>
-                                    <p:animEffect transition="in" filter="fade">
-                                      <p:cBhvr>
-                                        <p:cTn id="7" dur="500"/>
-                                        <p:tgtEl>
-                                          <p:spTgt spid="10"/>
                                         </p:tgtEl>
                                       </p:cBhvr>
                                     </p:animEffect>

</xml_diff>

<commit_message>
finalisation présentation avancement TFE
</commit_message>
<xml_diff>
--- a/présentation power point/Présentation avancement TFE.pptx
+++ b/présentation power point/Présentation avancement TFE.pptx
@@ -5,24 +5,25 @@
     <p:sldMasterId id="2147483648" r:id="rId1"/>
   </p:sldMasterIdLst>
   <p:notesMasterIdLst>
-    <p:notesMasterId r:id="rId14"/>
+    <p:notesMasterId r:id="rId15"/>
   </p:notesMasterIdLst>
   <p:handoutMasterIdLst>
-    <p:handoutMasterId r:id="rId15"/>
+    <p:handoutMasterId r:id="rId16"/>
   </p:handoutMasterIdLst>
   <p:sldIdLst>
     <p:sldId id="257" r:id="rId2"/>
     <p:sldId id="261" r:id="rId3"/>
     <p:sldId id="263" r:id="rId4"/>
-    <p:sldId id="272" r:id="rId5"/>
-    <p:sldId id="273" r:id="rId6"/>
-    <p:sldId id="264" r:id="rId7"/>
-    <p:sldId id="270" r:id="rId8"/>
-    <p:sldId id="267" r:id="rId9"/>
-    <p:sldId id="266" r:id="rId10"/>
-    <p:sldId id="268" r:id="rId11"/>
-    <p:sldId id="269" r:id="rId12"/>
-    <p:sldId id="271" r:id="rId13"/>
+    <p:sldId id="264" r:id="rId5"/>
+    <p:sldId id="270" r:id="rId6"/>
+    <p:sldId id="267" r:id="rId7"/>
+    <p:sldId id="266" r:id="rId8"/>
+    <p:sldId id="268" r:id="rId9"/>
+    <p:sldId id="269" r:id="rId10"/>
+    <p:sldId id="274" r:id="rId11"/>
+    <p:sldId id="272" r:id="rId12"/>
+    <p:sldId id="273" r:id="rId13"/>
+    <p:sldId id="271" r:id="rId14"/>
   </p:sldIdLst>
   <p:sldSz cx="9144000" cy="6858000" type="screen4x3"/>
   <p:notesSz cx="7099300" cy="10234613"/>
@@ -4013,7 +4014,7 @@
                   </a:outerShdw>
                 </a:effectLst>
               </a:rPr>
-              <a:t>Fonctionnement complet:</a:t>
+              <a:t>Fonctionnement API (Module):</a:t>
             </a:r>
           </a:p>
         </p:txBody>
@@ -4109,10 +4110,10 @@
       </p:sp>
       <p:pic>
         <p:nvPicPr>
-          <p:cNvPr id="10" name="Image 9">
+          <p:cNvPr id="9" name="Image 8">
             <a:extLst>
               <a:ext uri="{FF2B5EF4-FFF2-40B4-BE49-F238E27FC236}">
-                <a16:creationId xmlns:a16="http://schemas.microsoft.com/office/drawing/2014/main" id="{79C35690-DEF3-4EE9-B1C4-D9891C643ADF}"/>
+                <a16:creationId xmlns:a16="http://schemas.microsoft.com/office/drawing/2014/main" id="{6A945F2D-9DBA-4769-9E52-2FE7C9A238D8}"/>
               </a:ext>
             </a:extLst>
           </p:cNvPr>
@@ -4135,8 +4136,8 @@
         </p:blipFill>
         <p:spPr>
           <a:xfrm>
-            <a:off x="53752" y="2060848"/>
-            <a:ext cx="9036496" cy="3919862"/>
+            <a:off x="1578397" y="1988840"/>
+            <a:ext cx="5987206" cy="3969047"/>
           </a:xfrm>
           <a:prstGeom prst="rect">
             <a:avLst/>
@@ -4146,7 +4147,7 @@
     </p:spTree>
     <p:extLst>
       <p:ext uri="{BB962C8B-B14F-4D97-AF65-F5344CB8AC3E}">
-        <p14:creationId xmlns:p14="http://schemas.microsoft.com/office/powerpoint/2010/main" val="2102979741"/>
+        <p14:creationId xmlns:p14="http://schemas.microsoft.com/office/powerpoint/2010/main" val="4196001429"/>
       </p:ext>
     </p:extLst>
   </p:cSld>
@@ -4190,7 +4191,7 @@
                                           </p:stCondLst>
                                         </p:cTn>
                                         <p:tgtEl>
-                                          <p:spTgt spid="10"/>
+                                          <p:spTgt spid="9"/>
                                         </p:tgtEl>
                                         <p:attrNameLst>
                                           <p:attrName>style.visibility</p:attrName>
@@ -4204,7 +4205,7 @@
                                       <p:cBhvr>
                                         <p:cTn id="7" dur="500"/>
                                         <p:tgtEl>
-                                          <p:spTgt spid="10"/>
+                                          <p:spTgt spid="9"/>
                                         </p:tgtEl>
                                       </p:cBhvr>
                                     </p:animEffect>
@@ -4261,13 +4262,7 @@
       </p:grpSpPr>
       <p:sp>
         <p:nvSpPr>
-          <p:cNvPr id="2" name="Titre 1">
-            <a:extLst>
-              <a:ext uri="{FF2B5EF4-FFF2-40B4-BE49-F238E27FC236}">
-                <a16:creationId xmlns:a16="http://schemas.microsoft.com/office/drawing/2014/main" id="{3328684C-27C5-4573-8BD1-2AAF87373B35}"/>
-              </a:ext>
-            </a:extLst>
-          </p:cNvPr>
+          <p:cNvPr id="2" name="Titre 1"/>
           <p:cNvSpPr>
             <a:spLocks noGrp="1"/>
           </p:cNvSpPr>
@@ -4282,59 +4277,14 @@
           <a:p>
             <a:r>
               <a:rPr lang="fr-BE" dirty="0"/>
-              <a:t>Software</a:t>
-            </a:r>
-          </a:p>
-        </p:txBody>
-      </p:sp>
-      <p:sp>
-        <p:nvSpPr>
-          <p:cNvPr id="3" name="Espace réservé du contenu 2">
-            <a:extLst>
-              <a:ext uri="{FF2B5EF4-FFF2-40B4-BE49-F238E27FC236}">
-                <a16:creationId xmlns:a16="http://schemas.microsoft.com/office/drawing/2014/main" id="{904F9E68-5055-4F80-B6A4-3B277D1A4E17}"/>
-              </a:ext>
-            </a:extLst>
-          </p:cNvPr>
-          <p:cNvSpPr>
-            <a:spLocks noGrp="1"/>
-          </p:cNvSpPr>
-          <p:nvPr>
-            <p:ph idx="1"/>
-          </p:nvPr>
-        </p:nvSpPr>
-        <p:spPr/>
-        <p:txBody>
-          <a:bodyPr/>
-          <a:lstStyle/>
-          <a:p>
-            <a:pPr marL="0" indent="0">
-              <a:buNone/>
-            </a:pPr>
-            <a:r>
-              <a:rPr lang="fr-BE" u="sng" dirty="0">
-                <a:effectLst>
-                  <a:outerShdw blurRad="38100" dist="38100" dir="2700000" algn="tl">
-                    <a:srgbClr val="000000">
-                      <a:alpha val="43137"/>
-                    </a:srgbClr>
-                  </a:outerShdw>
-                </a:effectLst>
-              </a:rPr>
-              <a:t>Fonctionnement API:</a:t>
-            </a:r>
-          </a:p>
-        </p:txBody>
-      </p:sp>
-      <p:sp>
-        <p:nvSpPr>
-          <p:cNvPr id="4" name="Espace réservé de la date 3">
-            <a:extLst>
-              <a:ext uri="{FF2B5EF4-FFF2-40B4-BE49-F238E27FC236}">
-                <a16:creationId xmlns:a16="http://schemas.microsoft.com/office/drawing/2014/main" id="{1AAF3538-66FA-45FA-91DF-389B5B7A7172}"/>
-              </a:ext>
-            </a:extLst>
-          </p:cNvPr>
+              <a:t>Template Web</a:t>
+            </a:r>
+          </a:p>
+        </p:txBody>
+      </p:sp>
+      <p:sp>
+        <p:nvSpPr>
+          <p:cNvPr id="4" name="Espace réservé de la date 3"/>
           <p:cNvSpPr>
             <a:spLocks noGrp="1"/>
           </p:cNvSpPr>
@@ -4347,24 +4297,18 @@
           <a:bodyPr/>
           <a:lstStyle/>
           <a:p>
-            <a:fld id="{7F44ED6C-F45B-4CA7-82D8-BC1E073DDDCA}" type="datetime1">
+            <a:fld id="{247BEEBC-1960-4B40-834F-586131B91DBA}" type="datetime1">
               <a:rPr lang="fr-BE" smtClean="0"/>
               <a:pPr/>
-              <a:t>20-01-19</a:t>
+              <a:t>21-01-19</a:t>
             </a:fld>
-            <a:endParaRPr lang="fr-BE"/>
-          </a:p>
-        </p:txBody>
-      </p:sp>
-      <p:sp>
-        <p:nvSpPr>
-          <p:cNvPr id="5" name="Espace réservé du pied de page 4">
-            <a:extLst>
-              <a:ext uri="{FF2B5EF4-FFF2-40B4-BE49-F238E27FC236}">
-                <a16:creationId xmlns:a16="http://schemas.microsoft.com/office/drawing/2014/main" id="{0AC11A48-F826-44FF-9ECF-9F8BECA04C03}"/>
-              </a:ext>
-            </a:extLst>
-          </p:cNvPr>
+            <a:endParaRPr lang="fr-BE" dirty="0"/>
+          </a:p>
+        </p:txBody>
+      </p:sp>
+      <p:sp>
+        <p:nvSpPr>
+          <p:cNvPr id="5" name="Espace réservé du pied de page 4"/>
           <p:cNvSpPr>
             <a:spLocks noGrp="1"/>
           </p:cNvSpPr>
@@ -4378,22 +4322,15 @@
           <a:lstStyle/>
           <a:p>
             <a:r>
-              <a:rPr lang="fr-BE"/>
+              <a:rPr lang="fr-BE" dirty="0"/>
               <a:t>www.heh.be</a:t>
             </a:r>
-            <a:endParaRPr lang="fr-BE" dirty="0"/>
-          </a:p>
-        </p:txBody>
-      </p:sp>
-      <p:sp>
-        <p:nvSpPr>
-          <p:cNvPr id="6" name="Espace réservé du numéro de diapositive 5">
-            <a:extLst>
-              <a:ext uri="{FF2B5EF4-FFF2-40B4-BE49-F238E27FC236}">
-                <a16:creationId xmlns:a16="http://schemas.microsoft.com/office/drawing/2014/main" id="{BB324517-0111-4BC7-9BB4-9BCEF0E4D590}"/>
-              </a:ext>
-            </a:extLst>
-          </p:cNvPr>
+          </a:p>
+        </p:txBody>
+      </p:sp>
+      <p:sp>
+        <p:nvSpPr>
+          <p:cNvPr id="6" name="Espace réservé du numéro de diapositive 5"/>
           <p:cNvSpPr>
             <a:spLocks noGrp="1"/>
           </p:cNvSpPr>
@@ -4411,23 +4348,184 @@
               <a:pPr/>
               <a:t>11</a:t>
             </a:fld>
+            <a:endParaRPr lang="fr-BE" dirty="0"/>
+          </a:p>
+        </p:txBody>
+      </p:sp>
+    </p:spTree>
+    <p:extLst>
+      <p:ext uri="{BB962C8B-B14F-4D97-AF65-F5344CB8AC3E}">
+        <p14:creationId xmlns:p14="http://schemas.microsoft.com/office/powerpoint/2010/main" val="3778830616"/>
+      </p:ext>
+    </p:extLst>
+  </p:cSld>
+  <p:clrMapOvr>
+    <a:masterClrMapping/>
+  </p:clrMapOvr>
+  <mc:AlternateContent xmlns:mc="http://schemas.openxmlformats.org/markup-compatibility/2006" xmlns:p14="http://schemas.microsoft.com/office/powerpoint/2010/main">
+    <mc:Choice Requires="p14">
+      <p:transition spd="med" p14:dur="700">
+        <p:fade/>
+      </p:transition>
+    </mc:Choice>
+    <mc:Fallback xmlns="">
+      <p:transition spd="med">
+        <p:fade/>
+      </p:transition>
+    </mc:Fallback>
+  </mc:AlternateContent>
+</p:sld>
+</file>
+
+<file path=ppt/slides/slide12.xml><?xml version="1.0" encoding="utf-8"?>
+<p:sld xmlns:a="http://schemas.openxmlformats.org/drawingml/2006/main" xmlns:r="http://schemas.openxmlformats.org/officeDocument/2006/relationships" xmlns:p="http://schemas.openxmlformats.org/presentationml/2006/main">
+  <p:cSld>
+    <p:spTree>
+      <p:nvGrpSpPr>
+        <p:cNvPr id="1" name=""/>
+        <p:cNvGrpSpPr/>
+        <p:nvPr/>
+      </p:nvGrpSpPr>
+      <p:grpSpPr>
+        <a:xfrm>
+          <a:off x="0" y="0"/>
+          <a:ext cx="0" cy="0"/>
+          <a:chOff x="0" y="0"/>
+          <a:chExt cx="0" cy="0"/>
+        </a:xfrm>
+      </p:grpSpPr>
+      <p:sp>
+        <p:nvSpPr>
+          <p:cNvPr id="2" name="Titre 1">
+            <a:extLst>
+              <a:ext uri="{FF2B5EF4-FFF2-40B4-BE49-F238E27FC236}">
+                <a16:creationId xmlns:a16="http://schemas.microsoft.com/office/drawing/2014/main" id="{1B917D5A-823E-432E-AAEA-EF5FECE6CAD0}"/>
+              </a:ext>
+            </a:extLst>
+          </p:cNvPr>
+          <p:cNvSpPr>
+            <a:spLocks noGrp="1"/>
+          </p:cNvSpPr>
+          <p:nvPr>
+            <p:ph type="title"/>
+          </p:nvPr>
+        </p:nvSpPr>
+        <p:spPr/>
+        <p:txBody>
+          <a:bodyPr/>
+          <a:lstStyle/>
+          <a:p>
+            <a:r>
+              <a:rPr lang="fr-BE" dirty="0"/>
+              <a:t>Template Web</a:t>
+            </a:r>
+          </a:p>
+        </p:txBody>
+      </p:sp>
+      <p:sp>
+        <p:nvSpPr>
+          <p:cNvPr id="4" name="Espace réservé de la date 3">
+            <a:extLst>
+              <a:ext uri="{FF2B5EF4-FFF2-40B4-BE49-F238E27FC236}">
+                <a16:creationId xmlns:a16="http://schemas.microsoft.com/office/drawing/2014/main" id="{44539AD6-14FB-49BB-A398-A12A96EFC78E}"/>
+              </a:ext>
+            </a:extLst>
+          </p:cNvPr>
+          <p:cNvSpPr>
+            <a:spLocks noGrp="1"/>
+          </p:cNvSpPr>
+          <p:nvPr>
+            <p:ph type="dt" sz="half" idx="10"/>
+          </p:nvPr>
+        </p:nvSpPr>
+        <p:spPr/>
+        <p:txBody>
+          <a:bodyPr/>
+          <a:lstStyle/>
+          <a:p>
+            <a:fld id="{7F44ED6C-F45B-4CA7-82D8-BC1E073DDDCA}" type="datetime1">
+              <a:rPr lang="fr-BE" smtClean="0"/>
+              <a:pPr/>
+              <a:t>21-01-19</a:t>
+            </a:fld>
+            <a:endParaRPr lang="fr-BE"/>
+          </a:p>
+        </p:txBody>
+      </p:sp>
+      <p:sp>
+        <p:nvSpPr>
+          <p:cNvPr id="5" name="Espace réservé du pied de page 4">
+            <a:extLst>
+              <a:ext uri="{FF2B5EF4-FFF2-40B4-BE49-F238E27FC236}">
+                <a16:creationId xmlns:a16="http://schemas.microsoft.com/office/drawing/2014/main" id="{0B5FA403-17D9-4576-8BF9-5C045317F38B}"/>
+              </a:ext>
+            </a:extLst>
+          </p:cNvPr>
+          <p:cNvSpPr>
+            <a:spLocks noGrp="1"/>
+          </p:cNvSpPr>
+          <p:nvPr>
+            <p:ph type="ftr" sz="quarter" idx="11"/>
+          </p:nvPr>
+        </p:nvSpPr>
+        <p:spPr/>
+        <p:txBody>
+          <a:bodyPr/>
+          <a:lstStyle/>
+          <a:p>
+            <a:r>
+              <a:rPr lang="fr-BE"/>
+              <a:t>www.heh.be</a:t>
+            </a:r>
+            <a:endParaRPr lang="fr-BE" dirty="0"/>
+          </a:p>
+        </p:txBody>
+      </p:sp>
+      <p:sp>
+        <p:nvSpPr>
+          <p:cNvPr id="6" name="Espace réservé du numéro de diapositive 5">
+            <a:extLst>
+              <a:ext uri="{FF2B5EF4-FFF2-40B4-BE49-F238E27FC236}">
+                <a16:creationId xmlns:a16="http://schemas.microsoft.com/office/drawing/2014/main" id="{CDFC7354-82F2-41BC-9D41-49755556ADBA}"/>
+              </a:ext>
+            </a:extLst>
+          </p:cNvPr>
+          <p:cNvSpPr>
+            <a:spLocks noGrp="1"/>
+          </p:cNvSpPr>
+          <p:nvPr>
+            <p:ph type="sldNum" sz="quarter" idx="12"/>
+          </p:nvPr>
+        </p:nvSpPr>
+        <p:spPr/>
+        <p:txBody>
+          <a:bodyPr/>
+          <a:lstStyle/>
+          <a:p>
+            <a:fld id="{F8B969FB-3CDB-4BA7-BB65-4C9B3D66EC11}" type="slidenum">
+              <a:rPr lang="fr-BE" smtClean="0"/>
+              <a:pPr/>
+              <a:t>12</a:t>
+            </a:fld>
             <a:endParaRPr lang="fr-BE"/>
           </a:p>
         </p:txBody>
       </p:sp>
       <p:pic>
         <p:nvPicPr>
-          <p:cNvPr id="13" name="Image 12">
+          <p:cNvPr id="7" name="Espace réservé du contenu 6">
             <a:extLst>
               <a:ext uri="{FF2B5EF4-FFF2-40B4-BE49-F238E27FC236}">
-                <a16:creationId xmlns:a16="http://schemas.microsoft.com/office/drawing/2014/main" id="{1B57F6C0-BD4D-481F-A5E3-7B57DFF8F073}"/>
+                <a16:creationId xmlns:a16="http://schemas.microsoft.com/office/drawing/2014/main" id="{A0C46837-6D5E-4570-BABF-A3416246FB55}"/>
               </a:ext>
             </a:extLst>
           </p:cNvPr>
           <p:cNvPicPr>
-            <a:picLocks noChangeAspect="1"/>
+            <a:picLocks noGrp="1" noChangeAspect="1"/>
           </p:cNvPicPr>
-          <p:nvPr/>
+          <p:nvPr>
+            <p:ph idx="1"/>
+          </p:nvPr>
         </p:nvPicPr>
         <p:blipFill>
           <a:blip r:embed="rId2">
@@ -4443,18 +4541,195 @@
         </p:blipFill>
         <p:spPr>
           <a:xfrm>
-            <a:off x="2556160" y="1360135"/>
-            <a:ext cx="5698207" cy="4818668"/>
+            <a:off x="3302217" y="3717032"/>
+            <a:ext cx="2539566" cy="2040213"/>
+          </a:xfrm>
+        </p:spPr>
+      </p:pic>
+      <p:pic>
+        <p:nvPicPr>
+          <p:cNvPr id="10" name="Image 9">
+            <a:extLst>
+              <a:ext uri="{FF2B5EF4-FFF2-40B4-BE49-F238E27FC236}">
+                <a16:creationId xmlns:a16="http://schemas.microsoft.com/office/drawing/2014/main" id="{9DCBAE0F-1B2D-4A1A-B021-A28608CD9D58}"/>
+              </a:ext>
+            </a:extLst>
+          </p:cNvPr>
+          <p:cNvPicPr>
+            <a:picLocks noChangeAspect="1"/>
+          </p:cNvPicPr>
+          <p:nvPr/>
+        </p:nvPicPr>
+        <p:blipFill>
+          <a:blip r:embed="rId3">
+            <a:extLst>
+              <a:ext uri="{28A0092B-C50C-407E-A947-70E740481C1C}">
+                <a14:useLocalDpi xmlns:a14="http://schemas.microsoft.com/office/drawing/2010/main" val="0"/>
+              </a:ext>
+            </a:extLst>
+          </a:blip>
+          <a:stretch>
+            <a:fillRect/>
+          </a:stretch>
+        </p:blipFill>
+        <p:spPr>
+          <a:xfrm>
+            <a:off x="5606474" y="1504819"/>
+            <a:ext cx="2493919" cy="1997916"/>
           </a:xfrm>
           <a:prstGeom prst="rect">
             <a:avLst/>
           </a:prstGeom>
         </p:spPr>
       </p:pic>
+      <p:pic>
+        <p:nvPicPr>
+          <p:cNvPr id="12" name="Image 11">
+            <a:extLst>
+              <a:ext uri="{FF2B5EF4-FFF2-40B4-BE49-F238E27FC236}">
+                <a16:creationId xmlns:a16="http://schemas.microsoft.com/office/drawing/2014/main" id="{C591A5D0-31FA-4E79-A28A-8B06EA581569}"/>
+              </a:ext>
+            </a:extLst>
+          </p:cNvPr>
+          <p:cNvPicPr>
+            <a:picLocks noChangeAspect="1"/>
+          </p:cNvPicPr>
+          <p:nvPr/>
+        </p:nvPicPr>
+        <p:blipFill>
+          <a:blip r:embed="rId4">
+            <a:extLst>
+              <a:ext uri="{28A0092B-C50C-407E-A947-70E740481C1C}">
+                <a14:useLocalDpi xmlns:a14="http://schemas.microsoft.com/office/drawing/2010/main" val="0"/>
+              </a:ext>
+            </a:extLst>
+          </a:blip>
+          <a:stretch>
+            <a:fillRect/>
+          </a:stretch>
+        </p:blipFill>
+        <p:spPr>
+          <a:xfrm>
+            <a:off x="1043607" y="1504819"/>
+            <a:ext cx="2493919" cy="1996993"/>
+          </a:xfrm>
+          <a:prstGeom prst="rect">
+            <a:avLst/>
+          </a:prstGeom>
+        </p:spPr>
+      </p:pic>
+      <p:sp>
+        <p:nvSpPr>
+          <p:cNvPr id="3" name="ZoneTexte 2">
+            <a:extLst>
+              <a:ext uri="{FF2B5EF4-FFF2-40B4-BE49-F238E27FC236}">
+                <a16:creationId xmlns:a16="http://schemas.microsoft.com/office/drawing/2014/main" id="{AA2D86B3-55DB-46C5-815F-D8F58A430486}"/>
+              </a:ext>
+            </a:extLst>
+          </p:cNvPr>
+          <p:cNvSpPr txBox="1"/>
+          <p:nvPr/>
+        </p:nvSpPr>
+        <p:spPr>
+          <a:xfrm>
+            <a:off x="886410" y="3509544"/>
+            <a:ext cx="2808312" cy="261610"/>
+          </a:xfrm>
+          <a:prstGeom prst="rect">
+            <a:avLst/>
+          </a:prstGeom>
+          <a:noFill/>
+        </p:spPr>
+        <p:txBody>
+          <a:bodyPr wrap="square" rtlCol="0">
+            <a:spAutoFit/>
+          </a:bodyPr>
+          <a:lstStyle/>
+          <a:p>
+            <a:pPr algn="ctr"/>
+            <a:r>
+              <a:rPr lang="fr-BE" sz="1100" b="1" i="1" dirty="0"/>
+              <a:t>Figure 1 : Page connexion</a:t>
+            </a:r>
+          </a:p>
+        </p:txBody>
+      </p:sp>
+      <p:sp>
+        <p:nvSpPr>
+          <p:cNvPr id="11" name="ZoneTexte 10">
+            <a:extLst>
+              <a:ext uri="{FF2B5EF4-FFF2-40B4-BE49-F238E27FC236}">
+                <a16:creationId xmlns:a16="http://schemas.microsoft.com/office/drawing/2014/main" id="{C3478E71-2BA2-4001-8B54-CEA9E120BB98}"/>
+              </a:ext>
+            </a:extLst>
+          </p:cNvPr>
+          <p:cNvSpPr txBox="1"/>
+          <p:nvPr/>
+        </p:nvSpPr>
+        <p:spPr>
+          <a:xfrm>
+            <a:off x="3372456" y="5757245"/>
+            <a:ext cx="2399088" cy="261610"/>
+          </a:xfrm>
+          <a:prstGeom prst="rect">
+            <a:avLst/>
+          </a:prstGeom>
+          <a:noFill/>
+        </p:spPr>
+        <p:txBody>
+          <a:bodyPr wrap="square" rtlCol="0">
+            <a:spAutoFit/>
+          </a:bodyPr>
+          <a:lstStyle/>
+          <a:p>
+            <a:pPr algn="ctr"/>
+            <a:r>
+              <a:rPr lang="fr-BE" sz="1100" b="1" i="1" dirty="0"/>
+              <a:t>Figure 3 : Page Lumières</a:t>
+            </a:r>
+          </a:p>
+        </p:txBody>
+      </p:sp>
+      <p:sp>
+        <p:nvSpPr>
+          <p:cNvPr id="13" name="ZoneTexte 12">
+            <a:extLst>
+              <a:ext uri="{FF2B5EF4-FFF2-40B4-BE49-F238E27FC236}">
+                <a16:creationId xmlns:a16="http://schemas.microsoft.com/office/drawing/2014/main" id="{BEECC1F7-6622-4764-B48B-EA14522753C7}"/>
+              </a:ext>
+            </a:extLst>
+          </p:cNvPr>
+          <p:cNvSpPr txBox="1"/>
+          <p:nvPr/>
+        </p:nvSpPr>
+        <p:spPr>
+          <a:xfrm>
+            <a:off x="5685656" y="3498032"/>
+            <a:ext cx="2486744" cy="261610"/>
+          </a:xfrm>
+          <a:prstGeom prst="rect">
+            <a:avLst/>
+          </a:prstGeom>
+          <a:noFill/>
+        </p:spPr>
+        <p:txBody>
+          <a:bodyPr wrap="square" rtlCol="0">
+            <a:spAutoFit/>
+          </a:bodyPr>
+          <a:lstStyle/>
+          <a:p>
+            <a:pPr algn="ctr"/>
+            <a:r>
+              <a:rPr lang="fr-BE" sz="1100" b="1" i="1" dirty="0"/>
+              <a:t>Figure 2 : Page Utilisateurs</a:t>
+            </a:r>
+          </a:p>
+        </p:txBody>
+      </p:sp>
     </p:spTree>
     <p:extLst>
       <p:ext uri="{BB962C8B-B14F-4D97-AF65-F5344CB8AC3E}">
-        <p14:creationId xmlns:p14="http://schemas.microsoft.com/office/powerpoint/2010/main" val="1153252446"/>
+        <p14:creationId xmlns:p14="http://schemas.microsoft.com/office/powerpoint/2010/main" val="130087791"/>
       </p:ext>
     </p:extLst>
   </p:cSld>
@@ -4485,7 +4760,7 @@
                             </p:stCondLst>
                             <p:childTnLst>
                               <p:par>
-                                <p:cTn id="5" presetID="10" presetClass="entr" presetSubtype="0" fill="hold" nodeType="clickEffect">
+                                <p:cTn id="5" presetID="42" presetClass="entr" presetSubtype="0" fill="hold" nodeType="clickEffect">
                                   <p:stCondLst>
                                     <p:cond delay="0"/>
                                   </p:stCondLst>
@@ -4493,6 +4768,239 @@
                                     <p:set>
                                       <p:cBhvr>
                                         <p:cTn id="6" dur="1" fill="hold">
+                                          <p:stCondLst>
+                                            <p:cond delay="0"/>
+                                          </p:stCondLst>
+                                        </p:cTn>
+                                        <p:tgtEl>
+                                          <p:spTgt spid="12"/>
+                                        </p:tgtEl>
+                                        <p:attrNameLst>
+                                          <p:attrName>style.visibility</p:attrName>
+                                        </p:attrNameLst>
+                                      </p:cBhvr>
+                                      <p:to>
+                                        <p:strVal val="visible"/>
+                                      </p:to>
+                                    </p:set>
+                                    <p:animEffect transition="in" filter="fade">
+                                      <p:cBhvr>
+                                        <p:cTn id="7" dur="1000"/>
+                                        <p:tgtEl>
+                                          <p:spTgt spid="12"/>
+                                        </p:tgtEl>
+                                      </p:cBhvr>
+                                    </p:animEffect>
+                                    <p:anim calcmode="lin" valueType="num">
+                                      <p:cBhvr>
+                                        <p:cTn id="8" dur="1000" fill="hold"/>
+                                        <p:tgtEl>
+                                          <p:spTgt spid="12"/>
+                                        </p:tgtEl>
+                                        <p:attrNameLst>
+                                          <p:attrName>ppt_x</p:attrName>
+                                        </p:attrNameLst>
+                                      </p:cBhvr>
+                                      <p:tavLst>
+                                        <p:tav tm="0">
+                                          <p:val>
+                                            <p:strVal val="#ppt_x"/>
+                                          </p:val>
+                                        </p:tav>
+                                        <p:tav tm="100000">
+                                          <p:val>
+                                            <p:strVal val="#ppt_x"/>
+                                          </p:val>
+                                        </p:tav>
+                                      </p:tavLst>
+                                    </p:anim>
+                                    <p:anim calcmode="lin" valueType="num">
+                                      <p:cBhvr>
+                                        <p:cTn id="9" dur="1000" fill="hold"/>
+                                        <p:tgtEl>
+                                          <p:spTgt spid="12"/>
+                                        </p:tgtEl>
+                                        <p:attrNameLst>
+                                          <p:attrName>ppt_y</p:attrName>
+                                        </p:attrNameLst>
+                                      </p:cBhvr>
+                                      <p:tavLst>
+                                        <p:tav tm="0">
+                                          <p:val>
+                                            <p:strVal val="#ppt_y+.1"/>
+                                          </p:val>
+                                        </p:tav>
+                                        <p:tav tm="100000">
+                                          <p:val>
+                                            <p:strVal val="#ppt_y"/>
+                                          </p:val>
+                                        </p:tav>
+                                      </p:tavLst>
+                                    </p:anim>
+                                  </p:childTnLst>
+                                </p:cTn>
+                              </p:par>
+                            </p:childTnLst>
+                          </p:cTn>
+                        </p:par>
+                        <p:par>
+                          <p:cTn id="10" fill="hold">
+                            <p:stCondLst>
+                              <p:cond delay="1000"/>
+                            </p:stCondLst>
+                            <p:childTnLst>
+                              <p:par>
+                                <p:cTn id="11" presetID="10" presetClass="entr" presetSubtype="0" fill="hold" grpId="0" nodeType="afterEffect">
+                                  <p:stCondLst>
+                                    <p:cond delay="0"/>
+                                  </p:stCondLst>
+                                  <p:childTnLst>
+                                    <p:set>
+                                      <p:cBhvr>
+                                        <p:cTn id="12" dur="1" fill="hold">
+                                          <p:stCondLst>
+                                            <p:cond delay="0"/>
+                                          </p:stCondLst>
+                                        </p:cTn>
+                                        <p:tgtEl>
+                                          <p:spTgt spid="3"/>
+                                        </p:tgtEl>
+                                        <p:attrNameLst>
+                                          <p:attrName>style.visibility</p:attrName>
+                                        </p:attrNameLst>
+                                      </p:cBhvr>
+                                      <p:to>
+                                        <p:strVal val="visible"/>
+                                      </p:to>
+                                    </p:set>
+                                    <p:animEffect transition="in" filter="fade">
+                                      <p:cBhvr>
+                                        <p:cTn id="13" dur="250"/>
+                                        <p:tgtEl>
+                                          <p:spTgt spid="3"/>
+                                        </p:tgtEl>
+                                      </p:cBhvr>
+                                    </p:animEffect>
+                                  </p:childTnLst>
+                                </p:cTn>
+                              </p:par>
+                            </p:childTnLst>
+                          </p:cTn>
+                        </p:par>
+                      </p:childTnLst>
+                    </p:cTn>
+                  </p:par>
+                  <p:par>
+                    <p:cTn id="14" fill="hold">
+                      <p:stCondLst>
+                        <p:cond delay="indefinite"/>
+                      </p:stCondLst>
+                      <p:childTnLst>
+                        <p:par>
+                          <p:cTn id="15" fill="hold">
+                            <p:stCondLst>
+                              <p:cond delay="0"/>
+                            </p:stCondLst>
+                            <p:childTnLst>
+                              <p:par>
+                                <p:cTn id="16" presetID="42" presetClass="entr" presetSubtype="0" fill="hold" nodeType="clickEffect">
+                                  <p:stCondLst>
+                                    <p:cond delay="0"/>
+                                  </p:stCondLst>
+                                  <p:childTnLst>
+                                    <p:set>
+                                      <p:cBhvr>
+                                        <p:cTn id="17" dur="1" fill="hold">
+                                          <p:stCondLst>
+                                            <p:cond delay="0"/>
+                                          </p:stCondLst>
+                                        </p:cTn>
+                                        <p:tgtEl>
+                                          <p:spTgt spid="10"/>
+                                        </p:tgtEl>
+                                        <p:attrNameLst>
+                                          <p:attrName>style.visibility</p:attrName>
+                                        </p:attrNameLst>
+                                      </p:cBhvr>
+                                      <p:to>
+                                        <p:strVal val="visible"/>
+                                      </p:to>
+                                    </p:set>
+                                    <p:animEffect transition="in" filter="fade">
+                                      <p:cBhvr>
+                                        <p:cTn id="18" dur="1000"/>
+                                        <p:tgtEl>
+                                          <p:spTgt spid="10"/>
+                                        </p:tgtEl>
+                                      </p:cBhvr>
+                                    </p:animEffect>
+                                    <p:anim calcmode="lin" valueType="num">
+                                      <p:cBhvr>
+                                        <p:cTn id="19" dur="1000" fill="hold"/>
+                                        <p:tgtEl>
+                                          <p:spTgt spid="10"/>
+                                        </p:tgtEl>
+                                        <p:attrNameLst>
+                                          <p:attrName>ppt_x</p:attrName>
+                                        </p:attrNameLst>
+                                      </p:cBhvr>
+                                      <p:tavLst>
+                                        <p:tav tm="0">
+                                          <p:val>
+                                            <p:strVal val="#ppt_x"/>
+                                          </p:val>
+                                        </p:tav>
+                                        <p:tav tm="100000">
+                                          <p:val>
+                                            <p:strVal val="#ppt_x"/>
+                                          </p:val>
+                                        </p:tav>
+                                      </p:tavLst>
+                                    </p:anim>
+                                    <p:anim calcmode="lin" valueType="num">
+                                      <p:cBhvr>
+                                        <p:cTn id="20" dur="1000" fill="hold"/>
+                                        <p:tgtEl>
+                                          <p:spTgt spid="10"/>
+                                        </p:tgtEl>
+                                        <p:attrNameLst>
+                                          <p:attrName>ppt_y</p:attrName>
+                                        </p:attrNameLst>
+                                      </p:cBhvr>
+                                      <p:tavLst>
+                                        <p:tav tm="0">
+                                          <p:val>
+                                            <p:strVal val="#ppt_y+.1"/>
+                                          </p:val>
+                                        </p:tav>
+                                        <p:tav tm="100000">
+                                          <p:val>
+                                            <p:strVal val="#ppt_y"/>
+                                          </p:val>
+                                        </p:tav>
+                                      </p:tavLst>
+                                    </p:anim>
+                                  </p:childTnLst>
+                                </p:cTn>
+                              </p:par>
+                            </p:childTnLst>
+                          </p:cTn>
+                        </p:par>
+                        <p:par>
+                          <p:cTn id="21" fill="hold">
+                            <p:stCondLst>
+                              <p:cond delay="1000"/>
+                            </p:stCondLst>
+                            <p:childTnLst>
+                              <p:par>
+                                <p:cTn id="22" presetID="10" presetClass="entr" presetSubtype="0" fill="hold" grpId="0" nodeType="afterEffect">
+                                  <p:stCondLst>
+                                    <p:cond delay="0"/>
+                                  </p:stCondLst>
+                                  <p:childTnLst>
+                                    <p:set>
+                                      <p:cBhvr>
+                                        <p:cTn id="23" dur="1" fill="hold">
                                           <p:stCondLst>
                                             <p:cond delay="0"/>
                                           </p:stCondLst>
@@ -4510,9 +5018,152 @@
                                     </p:set>
                                     <p:animEffect transition="in" filter="fade">
                                       <p:cBhvr>
-                                        <p:cTn id="7" dur="500"/>
+                                        <p:cTn id="24" dur="250"/>
                                         <p:tgtEl>
                                           <p:spTgt spid="13"/>
+                                        </p:tgtEl>
+                                      </p:cBhvr>
+                                    </p:animEffect>
+                                  </p:childTnLst>
+                                </p:cTn>
+                              </p:par>
+                            </p:childTnLst>
+                          </p:cTn>
+                        </p:par>
+                      </p:childTnLst>
+                    </p:cTn>
+                  </p:par>
+                  <p:par>
+                    <p:cTn id="25" fill="hold">
+                      <p:stCondLst>
+                        <p:cond delay="indefinite"/>
+                      </p:stCondLst>
+                      <p:childTnLst>
+                        <p:par>
+                          <p:cTn id="26" fill="hold">
+                            <p:stCondLst>
+                              <p:cond delay="0"/>
+                            </p:stCondLst>
+                            <p:childTnLst>
+                              <p:par>
+                                <p:cTn id="27" presetID="42" presetClass="entr" presetSubtype="0" fill="hold" nodeType="clickEffect">
+                                  <p:stCondLst>
+                                    <p:cond delay="0"/>
+                                  </p:stCondLst>
+                                  <p:childTnLst>
+                                    <p:set>
+                                      <p:cBhvr>
+                                        <p:cTn id="28" dur="1" fill="hold">
+                                          <p:stCondLst>
+                                            <p:cond delay="0"/>
+                                          </p:stCondLst>
+                                        </p:cTn>
+                                        <p:tgtEl>
+                                          <p:spTgt spid="7"/>
+                                        </p:tgtEl>
+                                        <p:attrNameLst>
+                                          <p:attrName>style.visibility</p:attrName>
+                                        </p:attrNameLst>
+                                      </p:cBhvr>
+                                      <p:to>
+                                        <p:strVal val="visible"/>
+                                      </p:to>
+                                    </p:set>
+                                    <p:animEffect transition="in" filter="fade">
+                                      <p:cBhvr>
+                                        <p:cTn id="29" dur="1000"/>
+                                        <p:tgtEl>
+                                          <p:spTgt spid="7"/>
+                                        </p:tgtEl>
+                                      </p:cBhvr>
+                                    </p:animEffect>
+                                    <p:anim calcmode="lin" valueType="num">
+                                      <p:cBhvr>
+                                        <p:cTn id="30" dur="1000" fill="hold"/>
+                                        <p:tgtEl>
+                                          <p:spTgt spid="7"/>
+                                        </p:tgtEl>
+                                        <p:attrNameLst>
+                                          <p:attrName>ppt_x</p:attrName>
+                                        </p:attrNameLst>
+                                      </p:cBhvr>
+                                      <p:tavLst>
+                                        <p:tav tm="0">
+                                          <p:val>
+                                            <p:strVal val="#ppt_x"/>
+                                          </p:val>
+                                        </p:tav>
+                                        <p:tav tm="100000">
+                                          <p:val>
+                                            <p:strVal val="#ppt_x"/>
+                                          </p:val>
+                                        </p:tav>
+                                      </p:tavLst>
+                                    </p:anim>
+                                    <p:anim calcmode="lin" valueType="num">
+                                      <p:cBhvr>
+                                        <p:cTn id="31" dur="1000" fill="hold"/>
+                                        <p:tgtEl>
+                                          <p:spTgt spid="7"/>
+                                        </p:tgtEl>
+                                        <p:attrNameLst>
+                                          <p:attrName>ppt_y</p:attrName>
+                                        </p:attrNameLst>
+                                      </p:cBhvr>
+                                      <p:tavLst>
+                                        <p:tav tm="0">
+                                          <p:val>
+                                            <p:strVal val="#ppt_y+.1"/>
+                                          </p:val>
+                                        </p:tav>
+                                        <p:tav tm="100000">
+                                          <p:val>
+                                            <p:strVal val="#ppt_y"/>
+                                          </p:val>
+                                        </p:tav>
+                                      </p:tavLst>
+                                    </p:anim>
+                                  </p:childTnLst>
+                                </p:cTn>
+                              </p:par>
+                            </p:childTnLst>
+                          </p:cTn>
+                        </p:par>
+                        <p:par>
+                          <p:cTn id="32" fill="hold">
+                            <p:stCondLst>
+                              <p:cond delay="1250"/>
+                            </p:stCondLst>
+                            <p:childTnLst>
+                              <p:par>
+                                <p:cTn id="33" presetID="10" presetClass="entr" presetSubtype="0" fill="hold" grpId="0" nodeType="afterEffect">
+                                  <p:stCondLst>
+                                    <p:cond delay="0"/>
+                                  </p:stCondLst>
+                                  <p:childTnLst>
+                                    <p:set>
+                                      <p:cBhvr>
+                                        <p:cTn id="34" dur="1" fill="hold">
+                                          <p:stCondLst>
+                                            <p:cond delay="0"/>
+                                          </p:stCondLst>
+                                        </p:cTn>
+                                        <p:tgtEl>
+                                          <p:spTgt spid="11"/>
+                                        </p:tgtEl>
+                                        <p:attrNameLst>
+                                          <p:attrName>style.visibility</p:attrName>
+                                        </p:attrNameLst>
+                                      </p:cBhvr>
+                                      <p:to>
+                                        <p:strVal val="visible"/>
+                                      </p:to>
+                                    </p:set>
+                                    <p:animEffect transition="in" filter="fade">
+                                      <p:cBhvr>
+                                        <p:cTn id="35" dur="250"/>
+                                        <p:tgtEl>
+                                          <p:spTgt spid="11"/>
                                         </p:tgtEl>
                                       </p:cBhvr>
                                     </p:animEffect>
@@ -4546,11 +5197,16 @@
         </p:cTn>
       </p:par>
     </p:tnLst>
+    <p:bldLst>
+      <p:bldP spid="3" grpId="0"/>
+      <p:bldP spid="11" grpId="0"/>
+      <p:bldP spid="13" grpId="0"/>
+    </p:bldLst>
   </p:timing>
 </p:sld>
 </file>
 
-<file path=ppt/slides/slide12.xml><?xml version="1.0" encoding="utf-8"?>
+<file path=ppt/slides/slide13.xml><?xml version="1.0" encoding="utf-8"?>
 <p:sld xmlns:a="http://schemas.openxmlformats.org/drawingml/2006/main" xmlns:r="http://schemas.openxmlformats.org/officeDocument/2006/relationships" xmlns:p="http://schemas.openxmlformats.org/presentationml/2006/main">
   <p:cSld>
     <p:spTree>
@@ -4691,7 +5347,7 @@
             <a:fld id="{F8B969FB-3CDB-4BA7-BB65-4C9B3D66EC11}" type="slidenum">
               <a:rPr lang="fr-BE" smtClean="0"/>
               <a:pPr/>
-              <a:t>12</a:t>
+              <a:t>13</a:t>
             </a:fld>
             <a:endParaRPr lang="fr-BE"/>
           </a:p>
@@ -4707,6 +5363,18 @@
   <p:clrMapOvr>
     <a:masterClrMapping/>
   </p:clrMapOvr>
+  <mc:AlternateContent xmlns:mc="http://schemas.openxmlformats.org/markup-compatibility/2006">
+    <mc:Choice xmlns:p159="http://schemas.microsoft.com/office/powerpoint/2015/09/main" Requires="p159">
+      <p:transition xmlns:p14="http://schemas.microsoft.com/office/powerpoint/2010/main" spd="slow" p14:dur="2000">
+        <p159:morph option="byObject"/>
+      </p:transition>
+    </mc:Choice>
+    <mc:Fallback>
+      <p:transition spd="slow">
+        <p:fade/>
+      </p:transition>
+    </mc:Fallback>
+  </mc:AlternateContent>
 </p:sld>
 </file>
 
@@ -5158,14 +5826,26 @@
             <p:ph type="title"/>
           </p:nvPr>
         </p:nvSpPr>
-        <p:spPr/>
+        <p:spPr>
+          <a:xfrm>
+            <a:off x="722313" y="4406900"/>
+            <a:ext cx="7772400" cy="1362075"/>
+          </a:xfrm>
+        </p:spPr>
         <p:txBody>
           <a:bodyPr/>
           <a:lstStyle/>
           <a:p>
             <a:r>
               <a:rPr lang="fr-BE" dirty="0"/>
-              <a:t>Template Web</a:t>
+              <a:t>Fonctionnement</a:t>
+            </a:r>
+            <a:br>
+              <a:rPr lang="fr-BE" dirty="0"/>
+            </a:br>
+            <a:r>
+              <a:rPr lang="fr-BE" sz="2400" dirty="0"/>
+              <a:t>Hardware</a:t>
             </a:r>
           </a:p>
         </p:txBody>
@@ -5243,7 +5923,7 @@
     </p:spTree>
     <p:extLst>
       <p:ext uri="{BB962C8B-B14F-4D97-AF65-F5344CB8AC3E}">
-        <p14:creationId xmlns:p14="http://schemas.microsoft.com/office/powerpoint/2010/main" val="1047846715"/>
+        <p14:creationId xmlns:p14="http://schemas.microsoft.com/office/powerpoint/2010/main" val="1833672221"/>
       </p:ext>
     </p:extLst>
   </p:cSld>
@@ -5287,406 +5967,6 @@
           <p:cNvPr id="2" name="Titre 1">
             <a:extLst>
               <a:ext uri="{FF2B5EF4-FFF2-40B4-BE49-F238E27FC236}">
-                <a16:creationId xmlns:a16="http://schemas.microsoft.com/office/drawing/2014/main" id="{1B917D5A-823E-432E-AAEA-EF5FECE6CAD0}"/>
-              </a:ext>
-            </a:extLst>
-          </p:cNvPr>
-          <p:cNvSpPr>
-            <a:spLocks noGrp="1"/>
-          </p:cNvSpPr>
-          <p:nvPr>
-            <p:ph type="title"/>
-          </p:nvPr>
-        </p:nvSpPr>
-        <p:spPr/>
-        <p:txBody>
-          <a:bodyPr/>
-          <a:lstStyle/>
-          <a:p>
-            <a:r>
-              <a:rPr lang="fr-BE" dirty="0"/>
-              <a:t>Template Web</a:t>
-            </a:r>
-          </a:p>
-        </p:txBody>
-      </p:sp>
-      <p:sp>
-        <p:nvSpPr>
-          <p:cNvPr id="4" name="Espace réservé de la date 3">
-            <a:extLst>
-              <a:ext uri="{FF2B5EF4-FFF2-40B4-BE49-F238E27FC236}">
-                <a16:creationId xmlns:a16="http://schemas.microsoft.com/office/drawing/2014/main" id="{44539AD6-14FB-49BB-A398-A12A96EFC78E}"/>
-              </a:ext>
-            </a:extLst>
-          </p:cNvPr>
-          <p:cNvSpPr>
-            <a:spLocks noGrp="1"/>
-          </p:cNvSpPr>
-          <p:nvPr>
-            <p:ph type="dt" sz="half" idx="10"/>
-          </p:nvPr>
-        </p:nvSpPr>
-        <p:spPr/>
-        <p:txBody>
-          <a:bodyPr/>
-          <a:lstStyle/>
-          <a:p>
-            <a:fld id="{7F44ED6C-F45B-4CA7-82D8-BC1E073DDDCA}" type="datetime1">
-              <a:rPr lang="fr-BE" smtClean="0"/>
-              <a:pPr/>
-              <a:t>20-01-19</a:t>
-            </a:fld>
-            <a:endParaRPr lang="fr-BE"/>
-          </a:p>
-        </p:txBody>
-      </p:sp>
-      <p:sp>
-        <p:nvSpPr>
-          <p:cNvPr id="5" name="Espace réservé du pied de page 4">
-            <a:extLst>
-              <a:ext uri="{FF2B5EF4-FFF2-40B4-BE49-F238E27FC236}">
-                <a16:creationId xmlns:a16="http://schemas.microsoft.com/office/drawing/2014/main" id="{0B5FA403-17D9-4576-8BF9-5C045317F38B}"/>
-              </a:ext>
-            </a:extLst>
-          </p:cNvPr>
-          <p:cNvSpPr>
-            <a:spLocks noGrp="1"/>
-          </p:cNvSpPr>
-          <p:nvPr>
-            <p:ph type="ftr" sz="quarter" idx="11"/>
-          </p:nvPr>
-        </p:nvSpPr>
-        <p:spPr/>
-        <p:txBody>
-          <a:bodyPr/>
-          <a:lstStyle/>
-          <a:p>
-            <a:r>
-              <a:rPr lang="fr-BE"/>
-              <a:t>www.heh.be</a:t>
-            </a:r>
-            <a:endParaRPr lang="fr-BE" dirty="0"/>
-          </a:p>
-        </p:txBody>
-      </p:sp>
-      <p:sp>
-        <p:nvSpPr>
-          <p:cNvPr id="6" name="Espace réservé du numéro de diapositive 5">
-            <a:extLst>
-              <a:ext uri="{FF2B5EF4-FFF2-40B4-BE49-F238E27FC236}">
-                <a16:creationId xmlns:a16="http://schemas.microsoft.com/office/drawing/2014/main" id="{CDFC7354-82F2-41BC-9D41-49755556ADBA}"/>
-              </a:ext>
-            </a:extLst>
-          </p:cNvPr>
-          <p:cNvSpPr>
-            <a:spLocks noGrp="1"/>
-          </p:cNvSpPr>
-          <p:nvPr>
-            <p:ph type="sldNum" sz="quarter" idx="12"/>
-          </p:nvPr>
-        </p:nvSpPr>
-        <p:spPr/>
-        <p:txBody>
-          <a:bodyPr/>
-          <a:lstStyle/>
-          <a:p>
-            <a:fld id="{F8B969FB-3CDB-4BA7-BB65-4C9B3D66EC11}" type="slidenum">
-              <a:rPr lang="fr-BE" smtClean="0"/>
-              <a:pPr/>
-              <a:t>5</a:t>
-            </a:fld>
-            <a:endParaRPr lang="fr-BE"/>
-          </a:p>
-        </p:txBody>
-      </p:sp>
-      <p:pic>
-        <p:nvPicPr>
-          <p:cNvPr id="7" name="Espace réservé du contenu 6">
-            <a:extLst>
-              <a:ext uri="{FF2B5EF4-FFF2-40B4-BE49-F238E27FC236}">
-                <a16:creationId xmlns:a16="http://schemas.microsoft.com/office/drawing/2014/main" id="{A0C46837-6D5E-4570-BABF-A3416246FB55}"/>
-              </a:ext>
-            </a:extLst>
-          </p:cNvPr>
-          <p:cNvPicPr>
-            <a:picLocks noGrp="1" noChangeAspect="1"/>
-          </p:cNvPicPr>
-          <p:nvPr>
-            <p:ph idx="1"/>
-          </p:nvPr>
-        </p:nvPicPr>
-        <p:blipFill>
-          <a:blip r:embed="rId2">
-            <a:extLst>
-              <a:ext uri="{28A0092B-C50C-407E-A947-70E740481C1C}">
-                <a14:useLocalDpi xmlns:a14="http://schemas.microsoft.com/office/drawing/2010/main" val="0"/>
-              </a:ext>
-            </a:extLst>
-          </a:blip>
-          <a:stretch>
-            <a:fillRect/>
-          </a:stretch>
-        </p:blipFill>
-        <p:spPr>
-          <a:xfrm>
-            <a:off x="3302217" y="3861048"/>
-            <a:ext cx="2539566" cy="2040213"/>
-          </a:xfrm>
-        </p:spPr>
-      </p:pic>
-      <p:pic>
-        <p:nvPicPr>
-          <p:cNvPr id="10" name="Image 9">
-            <a:extLst>
-              <a:ext uri="{FF2B5EF4-FFF2-40B4-BE49-F238E27FC236}">
-                <a16:creationId xmlns:a16="http://schemas.microsoft.com/office/drawing/2014/main" id="{9DCBAE0F-1B2D-4A1A-B021-A28608CD9D58}"/>
-              </a:ext>
-            </a:extLst>
-          </p:cNvPr>
-          <p:cNvPicPr>
-            <a:picLocks noChangeAspect="1"/>
-          </p:cNvPicPr>
-          <p:nvPr/>
-        </p:nvPicPr>
-        <p:blipFill>
-          <a:blip r:embed="rId3">
-            <a:extLst>
-              <a:ext uri="{28A0092B-C50C-407E-A947-70E740481C1C}">
-                <a14:useLocalDpi xmlns:a14="http://schemas.microsoft.com/office/drawing/2010/main" val="0"/>
-              </a:ext>
-            </a:extLst>
-          </a:blip>
-          <a:stretch>
-            <a:fillRect/>
-          </a:stretch>
-        </p:blipFill>
-        <p:spPr>
-          <a:xfrm>
-            <a:off x="5606474" y="1504819"/>
-            <a:ext cx="2493919" cy="1997916"/>
-          </a:xfrm>
-          <a:prstGeom prst="rect">
-            <a:avLst/>
-          </a:prstGeom>
-        </p:spPr>
-      </p:pic>
-      <p:pic>
-        <p:nvPicPr>
-          <p:cNvPr id="12" name="Image 11">
-            <a:extLst>
-              <a:ext uri="{FF2B5EF4-FFF2-40B4-BE49-F238E27FC236}">
-                <a16:creationId xmlns:a16="http://schemas.microsoft.com/office/drawing/2014/main" id="{C591A5D0-31FA-4E79-A28A-8B06EA581569}"/>
-              </a:ext>
-            </a:extLst>
-          </p:cNvPr>
-          <p:cNvPicPr>
-            <a:picLocks noChangeAspect="1"/>
-          </p:cNvPicPr>
-          <p:nvPr/>
-        </p:nvPicPr>
-        <p:blipFill>
-          <a:blip r:embed="rId4">
-            <a:extLst>
-              <a:ext uri="{28A0092B-C50C-407E-A947-70E740481C1C}">
-                <a14:useLocalDpi xmlns:a14="http://schemas.microsoft.com/office/drawing/2010/main" val="0"/>
-              </a:ext>
-            </a:extLst>
-          </a:blip>
-          <a:stretch>
-            <a:fillRect/>
-          </a:stretch>
-        </p:blipFill>
-        <p:spPr>
-          <a:xfrm>
-            <a:off x="1043607" y="1504819"/>
-            <a:ext cx="2493919" cy="1996993"/>
-          </a:xfrm>
-          <a:prstGeom prst="rect">
-            <a:avLst/>
-          </a:prstGeom>
-        </p:spPr>
-      </p:pic>
-    </p:spTree>
-    <p:extLst>
-      <p:ext uri="{BB962C8B-B14F-4D97-AF65-F5344CB8AC3E}">
-        <p14:creationId xmlns:p14="http://schemas.microsoft.com/office/powerpoint/2010/main" val="2497645882"/>
-      </p:ext>
-    </p:extLst>
-  </p:cSld>
-  <p:clrMapOvr>
-    <a:masterClrMapping/>
-  </p:clrMapOvr>
-</p:sld>
-</file>
-
-<file path=ppt/slides/slide6.xml><?xml version="1.0" encoding="utf-8"?>
-<p:sld xmlns:a="http://schemas.openxmlformats.org/drawingml/2006/main" xmlns:r="http://schemas.openxmlformats.org/officeDocument/2006/relationships" xmlns:p="http://schemas.openxmlformats.org/presentationml/2006/main">
-  <p:cSld>
-    <p:spTree>
-      <p:nvGrpSpPr>
-        <p:cNvPr id="1" name=""/>
-        <p:cNvGrpSpPr/>
-        <p:nvPr/>
-      </p:nvGrpSpPr>
-      <p:grpSpPr>
-        <a:xfrm>
-          <a:off x="0" y="0"/>
-          <a:ext cx="0" cy="0"/>
-          <a:chOff x="0" y="0"/>
-          <a:chExt cx="0" cy="0"/>
-        </a:xfrm>
-      </p:grpSpPr>
-      <p:sp>
-        <p:nvSpPr>
-          <p:cNvPr id="2" name="Titre 1"/>
-          <p:cNvSpPr>
-            <a:spLocks noGrp="1"/>
-          </p:cNvSpPr>
-          <p:nvPr>
-            <p:ph type="title"/>
-          </p:nvPr>
-        </p:nvSpPr>
-        <p:spPr>
-          <a:xfrm>
-            <a:off x="722313" y="4406900"/>
-            <a:ext cx="7772400" cy="1362075"/>
-          </a:xfrm>
-        </p:spPr>
-        <p:txBody>
-          <a:bodyPr/>
-          <a:lstStyle/>
-          <a:p>
-            <a:r>
-              <a:rPr lang="fr-BE" dirty="0"/>
-              <a:t>Fonctionnement</a:t>
-            </a:r>
-            <a:br>
-              <a:rPr lang="fr-BE" dirty="0"/>
-            </a:br>
-            <a:r>
-              <a:rPr lang="fr-BE" sz="2400" dirty="0"/>
-              <a:t>Hardware</a:t>
-            </a:r>
-          </a:p>
-        </p:txBody>
-      </p:sp>
-      <p:sp>
-        <p:nvSpPr>
-          <p:cNvPr id="4" name="Espace réservé de la date 3"/>
-          <p:cNvSpPr>
-            <a:spLocks noGrp="1"/>
-          </p:cNvSpPr>
-          <p:nvPr>
-            <p:ph type="dt" sz="half" idx="10"/>
-          </p:nvPr>
-        </p:nvSpPr>
-        <p:spPr/>
-        <p:txBody>
-          <a:bodyPr/>
-          <a:lstStyle/>
-          <a:p>
-            <a:fld id="{247BEEBC-1960-4B40-834F-586131B91DBA}" type="datetime1">
-              <a:rPr lang="fr-BE" smtClean="0"/>
-              <a:pPr/>
-              <a:t>20-01-19</a:t>
-            </a:fld>
-            <a:endParaRPr lang="fr-BE" dirty="0"/>
-          </a:p>
-        </p:txBody>
-      </p:sp>
-      <p:sp>
-        <p:nvSpPr>
-          <p:cNvPr id="5" name="Espace réservé du pied de page 4"/>
-          <p:cNvSpPr>
-            <a:spLocks noGrp="1"/>
-          </p:cNvSpPr>
-          <p:nvPr>
-            <p:ph type="ftr" sz="quarter" idx="11"/>
-          </p:nvPr>
-        </p:nvSpPr>
-        <p:spPr/>
-        <p:txBody>
-          <a:bodyPr/>
-          <a:lstStyle/>
-          <a:p>
-            <a:r>
-              <a:rPr lang="fr-BE" dirty="0"/>
-              <a:t>www.heh.be</a:t>
-            </a:r>
-          </a:p>
-        </p:txBody>
-      </p:sp>
-      <p:sp>
-        <p:nvSpPr>
-          <p:cNvPr id="6" name="Espace réservé du numéro de diapositive 5"/>
-          <p:cNvSpPr>
-            <a:spLocks noGrp="1"/>
-          </p:cNvSpPr>
-          <p:nvPr>
-            <p:ph type="sldNum" sz="quarter" idx="12"/>
-          </p:nvPr>
-        </p:nvSpPr>
-        <p:spPr/>
-        <p:txBody>
-          <a:bodyPr/>
-          <a:lstStyle/>
-          <a:p>
-            <a:fld id="{F8B969FB-3CDB-4BA7-BB65-4C9B3D66EC11}" type="slidenum">
-              <a:rPr lang="fr-BE" smtClean="0"/>
-              <a:pPr/>
-              <a:t>6</a:t>
-            </a:fld>
-            <a:endParaRPr lang="fr-BE" dirty="0"/>
-          </a:p>
-        </p:txBody>
-      </p:sp>
-    </p:spTree>
-    <p:extLst>
-      <p:ext uri="{BB962C8B-B14F-4D97-AF65-F5344CB8AC3E}">
-        <p14:creationId xmlns:p14="http://schemas.microsoft.com/office/powerpoint/2010/main" val="1833672221"/>
-      </p:ext>
-    </p:extLst>
-  </p:cSld>
-  <p:clrMapOvr>
-    <a:masterClrMapping/>
-  </p:clrMapOvr>
-  <mc:AlternateContent xmlns:mc="http://schemas.openxmlformats.org/markup-compatibility/2006" xmlns:p14="http://schemas.microsoft.com/office/powerpoint/2010/main">
-    <mc:Choice Requires="p14">
-      <p:transition spd="med" p14:dur="700">
-        <p:fade/>
-      </p:transition>
-    </mc:Choice>
-    <mc:Fallback xmlns="">
-      <p:transition spd="med">
-        <p:fade/>
-      </p:transition>
-    </mc:Fallback>
-  </mc:AlternateContent>
-</p:sld>
-</file>
-
-<file path=ppt/slides/slide7.xml><?xml version="1.0" encoding="utf-8"?>
-<p:sld xmlns:a="http://schemas.openxmlformats.org/drawingml/2006/main" xmlns:r="http://schemas.openxmlformats.org/officeDocument/2006/relationships" xmlns:p="http://schemas.openxmlformats.org/presentationml/2006/main">
-  <p:cSld>
-    <p:spTree>
-      <p:nvGrpSpPr>
-        <p:cNvPr id="1" name=""/>
-        <p:cNvGrpSpPr/>
-        <p:nvPr/>
-      </p:nvGrpSpPr>
-      <p:grpSpPr>
-        <a:xfrm>
-          <a:off x="0" y="0"/>
-          <a:ext cx="0" cy="0"/>
-          <a:chOff x="0" y="0"/>
-          <a:chExt cx="0" cy="0"/>
-        </a:xfrm>
-      </p:grpSpPr>
-      <p:sp>
-        <p:nvSpPr>
-          <p:cNvPr id="2" name="Titre 1">
-            <a:extLst>
-              <a:ext uri="{FF2B5EF4-FFF2-40B4-BE49-F238E27FC236}">
                 <a16:creationId xmlns:a16="http://schemas.microsoft.com/office/drawing/2014/main" id="{5611F909-6451-4A34-9AA4-55B3CB59C5B9}"/>
               </a:ext>
             </a:extLst>
@@ -6011,7 +6291,7 @@
             <a:fld id="{F8B969FB-3CDB-4BA7-BB65-4C9B3D66EC11}" type="slidenum">
               <a:rPr lang="fr-BE" smtClean="0"/>
               <a:pPr/>
-              <a:t>7</a:t>
+              <a:t>5</a:t>
             </a:fld>
             <a:endParaRPr lang="fr-BE"/>
           </a:p>
@@ -6864,7 +7144,7 @@
 </p:sld>
 </file>
 
-<file path=ppt/slides/slide8.xml><?xml version="1.0" encoding="utf-8"?>
+<file path=ppt/slides/slide6.xml><?xml version="1.0" encoding="utf-8"?>
 <p:sld xmlns:a="http://schemas.openxmlformats.org/drawingml/2006/main" xmlns:r="http://schemas.openxmlformats.org/officeDocument/2006/relationships" xmlns:p="http://schemas.openxmlformats.org/presentationml/2006/main">
   <p:cSld>
     <p:spTree>
@@ -6980,7 +7260,7 @@
             <a:fld id="{F8B969FB-3CDB-4BA7-BB65-4C9B3D66EC11}" type="slidenum">
               <a:rPr lang="fr-BE" smtClean="0"/>
               <a:pPr/>
-              <a:t>8</a:t>
+              <a:t>6</a:t>
             </a:fld>
             <a:endParaRPr lang="fr-BE" dirty="0"/>
           </a:p>
@@ -7011,7 +7291,7 @@
 </p:sld>
 </file>
 
-<file path=ppt/slides/slide9.xml><?xml version="1.0" encoding="utf-8"?>
+<file path=ppt/slides/slide7.xml><?xml version="1.0" encoding="utf-8"?>
 <p:sld xmlns:a="http://schemas.openxmlformats.org/drawingml/2006/main" xmlns:r="http://schemas.openxmlformats.org/officeDocument/2006/relationships" xmlns:p="http://schemas.openxmlformats.org/presentationml/2006/main">
   <p:cSld>
     <p:spTree>
@@ -7178,7 +7458,7 @@
             <a:fld id="{F8B969FB-3CDB-4BA7-BB65-4C9B3D66EC11}" type="slidenum">
               <a:rPr lang="fr-BE" smtClean="0"/>
               <a:pPr/>
-              <a:t>9</a:t>
+              <a:t>7</a:t>
             </a:fld>
             <a:endParaRPr lang="fr-BE"/>
           </a:p>
@@ -7282,6 +7562,646 @@
                                         <p:cTn id="7" dur="500"/>
                                         <p:tgtEl>
                                           <p:spTgt spid="8"/>
+                                        </p:tgtEl>
+                                      </p:cBhvr>
+                                    </p:animEffect>
+                                  </p:childTnLst>
+                                </p:cTn>
+                              </p:par>
+                            </p:childTnLst>
+                          </p:cTn>
+                        </p:par>
+                      </p:childTnLst>
+                    </p:cTn>
+                  </p:par>
+                </p:childTnLst>
+              </p:cTn>
+              <p:prevCondLst>
+                <p:cond evt="onPrev" delay="0">
+                  <p:tgtEl>
+                    <p:sldTgt/>
+                  </p:tgtEl>
+                </p:cond>
+              </p:prevCondLst>
+              <p:nextCondLst>
+                <p:cond evt="onNext" delay="0">
+                  <p:tgtEl>
+                    <p:sldTgt/>
+                  </p:tgtEl>
+                </p:cond>
+              </p:nextCondLst>
+            </p:seq>
+          </p:childTnLst>
+        </p:cTn>
+      </p:par>
+    </p:tnLst>
+  </p:timing>
+</p:sld>
+</file>
+
+<file path=ppt/slides/slide8.xml><?xml version="1.0" encoding="utf-8"?>
+<p:sld xmlns:a="http://schemas.openxmlformats.org/drawingml/2006/main" xmlns:r="http://schemas.openxmlformats.org/officeDocument/2006/relationships" xmlns:p="http://schemas.openxmlformats.org/presentationml/2006/main">
+  <p:cSld>
+    <p:spTree>
+      <p:nvGrpSpPr>
+        <p:cNvPr id="1" name=""/>
+        <p:cNvGrpSpPr/>
+        <p:nvPr/>
+      </p:nvGrpSpPr>
+      <p:grpSpPr>
+        <a:xfrm>
+          <a:off x="0" y="0"/>
+          <a:ext cx="0" cy="0"/>
+          <a:chOff x="0" y="0"/>
+          <a:chExt cx="0" cy="0"/>
+        </a:xfrm>
+      </p:grpSpPr>
+      <p:sp>
+        <p:nvSpPr>
+          <p:cNvPr id="2" name="Titre 1">
+            <a:extLst>
+              <a:ext uri="{FF2B5EF4-FFF2-40B4-BE49-F238E27FC236}">
+                <a16:creationId xmlns:a16="http://schemas.microsoft.com/office/drawing/2014/main" id="{3328684C-27C5-4573-8BD1-2AAF87373B35}"/>
+              </a:ext>
+            </a:extLst>
+          </p:cNvPr>
+          <p:cNvSpPr>
+            <a:spLocks noGrp="1"/>
+          </p:cNvSpPr>
+          <p:nvPr>
+            <p:ph type="title"/>
+          </p:nvPr>
+        </p:nvSpPr>
+        <p:spPr/>
+        <p:txBody>
+          <a:bodyPr/>
+          <a:lstStyle/>
+          <a:p>
+            <a:r>
+              <a:rPr lang="fr-BE" dirty="0"/>
+              <a:t>Software</a:t>
+            </a:r>
+          </a:p>
+        </p:txBody>
+      </p:sp>
+      <p:sp>
+        <p:nvSpPr>
+          <p:cNvPr id="3" name="Espace réservé du contenu 2">
+            <a:extLst>
+              <a:ext uri="{FF2B5EF4-FFF2-40B4-BE49-F238E27FC236}">
+                <a16:creationId xmlns:a16="http://schemas.microsoft.com/office/drawing/2014/main" id="{904F9E68-5055-4F80-B6A4-3B277D1A4E17}"/>
+              </a:ext>
+            </a:extLst>
+          </p:cNvPr>
+          <p:cNvSpPr>
+            <a:spLocks noGrp="1"/>
+          </p:cNvSpPr>
+          <p:nvPr>
+            <p:ph idx="1"/>
+          </p:nvPr>
+        </p:nvSpPr>
+        <p:spPr/>
+        <p:txBody>
+          <a:bodyPr/>
+          <a:lstStyle/>
+          <a:p>
+            <a:pPr marL="0" indent="0">
+              <a:buNone/>
+            </a:pPr>
+            <a:r>
+              <a:rPr lang="fr-BE" u="sng" dirty="0">
+                <a:effectLst>
+                  <a:outerShdw blurRad="38100" dist="38100" dir="2700000" algn="tl">
+                    <a:srgbClr val="000000">
+                      <a:alpha val="43137"/>
+                    </a:srgbClr>
+                  </a:outerShdw>
+                </a:effectLst>
+              </a:rPr>
+              <a:t>Fonctionnement complet:</a:t>
+            </a:r>
+          </a:p>
+        </p:txBody>
+      </p:sp>
+      <p:sp>
+        <p:nvSpPr>
+          <p:cNvPr id="4" name="Espace réservé de la date 3">
+            <a:extLst>
+              <a:ext uri="{FF2B5EF4-FFF2-40B4-BE49-F238E27FC236}">
+                <a16:creationId xmlns:a16="http://schemas.microsoft.com/office/drawing/2014/main" id="{1AAF3538-66FA-45FA-91DF-389B5B7A7172}"/>
+              </a:ext>
+            </a:extLst>
+          </p:cNvPr>
+          <p:cNvSpPr>
+            <a:spLocks noGrp="1"/>
+          </p:cNvSpPr>
+          <p:nvPr>
+            <p:ph type="dt" sz="half" idx="10"/>
+          </p:nvPr>
+        </p:nvSpPr>
+        <p:spPr/>
+        <p:txBody>
+          <a:bodyPr/>
+          <a:lstStyle/>
+          <a:p>
+            <a:fld id="{7F44ED6C-F45B-4CA7-82D8-BC1E073DDDCA}" type="datetime1">
+              <a:rPr lang="fr-BE" smtClean="0"/>
+              <a:pPr/>
+              <a:t>20-01-19</a:t>
+            </a:fld>
+            <a:endParaRPr lang="fr-BE"/>
+          </a:p>
+        </p:txBody>
+      </p:sp>
+      <p:sp>
+        <p:nvSpPr>
+          <p:cNvPr id="5" name="Espace réservé du pied de page 4">
+            <a:extLst>
+              <a:ext uri="{FF2B5EF4-FFF2-40B4-BE49-F238E27FC236}">
+                <a16:creationId xmlns:a16="http://schemas.microsoft.com/office/drawing/2014/main" id="{0AC11A48-F826-44FF-9ECF-9F8BECA04C03}"/>
+              </a:ext>
+            </a:extLst>
+          </p:cNvPr>
+          <p:cNvSpPr>
+            <a:spLocks noGrp="1"/>
+          </p:cNvSpPr>
+          <p:nvPr>
+            <p:ph type="ftr" sz="quarter" idx="11"/>
+          </p:nvPr>
+        </p:nvSpPr>
+        <p:spPr/>
+        <p:txBody>
+          <a:bodyPr/>
+          <a:lstStyle/>
+          <a:p>
+            <a:r>
+              <a:rPr lang="fr-BE"/>
+              <a:t>www.heh.be</a:t>
+            </a:r>
+            <a:endParaRPr lang="fr-BE" dirty="0"/>
+          </a:p>
+        </p:txBody>
+      </p:sp>
+      <p:sp>
+        <p:nvSpPr>
+          <p:cNvPr id="6" name="Espace réservé du numéro de diapositive 5">
+            <a:extLst>
+              <a:ext uri="{FF2B5EF4-FFF2-40B4-BE49-F238E27FC236}">
+                <a16:creationId xmlns:a16="http://schemas.microsoft.com/office/drawing/2014/main" id="{BB324517-0111-4BC7-9BB4-9BCEF0E4D590}"/>
+              </a:ext>
+            </a:extLst>
+          </p:cNvPr>
+          <p:cNvSpPr>
+            <a:spLocks noGrp="1"/>
+          </p:cNvSpPr>
+          <p:nvPr>
+            <p:ph type="sldNum" sz="quarter" idx="12"/>
+          </p:nvPr>
+        </p:nvSpPr>
+        <p:spPr/>
+        <p:txBody>
+          <a:bodyPr/>
+          <a:lstStyle/>
+          <a:p>
+            <a:fld id="{F8B969FB-3CDB-4BA7-BB65-4C9B3D66EC11}" type="slidenum">
+              <a:rPr lang="fr-BE" smtClean="0"/>
+              <a:pPr/>
+              <a:t>8</a:t>
+            </a:fld>
+            <a:endParaRPr lang="fr-BE"/>
+          </a:p>
+        </p:txBody>
+      </p:sp>
+      <p:pic>
+        <p:nvPicPr>
+          <p:cNvPr id="10" name="Image 9">
+            <a:extLst>
+              <a:ext uri="{FF2B5EF4-FFF2-40B4-BE49-F238E27FC236}">
+                <a16:creationId xmlns:a16="http://schemas.microsoft.com/office/drawing/2014/main" id="{79C35690-DEF3-4EE9-B1C4-D9891C643ADF}"/>
+              </a:ext>
+            </a:extLst>
+          </p:cNvPr>
+          <p:cNvPicPr>
+            <a:picLocks noChangeAspect="1"/>
+          </p:cNvPicPr>
+          <p:nvPr/>
+        </p:nvPicPr>
+        <p:blipFill>
+          <a:blip r:embed="rId2">
+            <a:extLst>
+              <a:ext uri="{28A0092B-C50C-407E-A947-70E740481C1C}">
+                <a14:useLocalDpi xmlns:a14="http://schemas.microsoft.com/office/drawing/2010/main" val="0"/>
+              </a:ext>
+            </a:extLst>
+          </a:blip>
+          <a:stretch>
+            <a:fillRect/>
+          </a:stretch>
+        </p:blipFill>
+        <p:spPr>
+          <a:xfrm>
+            <a:off x="53752" y="2060848"/>
+            <a:ext cx="9036496" cy="3919862"/>
+          </a:xfrm>
+          <a:prstGeom prst="rect">
+            <a:avLst/>
+          </a:prstGeom>
+        </p:spPr>
+      </p:pic>
+    </p:spTree>
+    <p:extLst>
+      <p:ext uri="{BB962C8B-B14F-4D97-AF65-F5344CB8AC3E}">
+        <p14:creationId xmlns:p14="http://schemas.microsoft.com/office/powerpoint/2010/main" val="2102979741"/>
+      </p:ext>
+    </p:extLst>
+  </p:cSld>
+  <p:clrMapOvr>
+    <a:masterClrMapping/>
+  </p:clrMapOvr>
+  <p:transition spd="slow">
+    <p:cover/>
+  </p:transition>
+  <p:timing>
+    <p:tnLst>
+      <p:par>
+        <p:cTn id="1" dur="indefinite" restart="never" nodeType="tmRoot">
+          <p:childTnLst>
+            <p:seq concurrent="1" nextAc="seek">
+              <p:cTn id="2" dur="indefinite" nodeType="mainSeq">
+                <p:childTnLst>
+                  <p:par>
+                    <p:cTn id="3" fill="hold">
+                      <p:stCondLst>
+                        <p:cond delay="indefinite"/>
+                      </p:stCondLst>
+                      <p:childTnLst>
+                        <p:par>
+                          <p:cTn id="4" fill="hold">
+                            <p:stCondLst>
+                              <p:cond delay="0"/>
+                            </p:stCondLst>
+                            <p:childTnLst>
+                              <p:par>
+                                <p:cTn id="5" presetID="10" presetClass="entr" presetSubtype="0" fill="hold" nodeType="clickEffect">
+                                  <p:stCondLst>
+                                    <p:cond delay="0"/>
+                                  </p:stCondLst>
+                                  <p:childTnLst>
+                                    <p:set>
+                                      <p:cBhvr>
+                                        <p:cTn id="6" dur="1" fill="hold">
+                                          <p:stCondLst>
+                                            <p:cond delay="0"/>
+                                          </p:stCondLst>
+                                        </p:cTn>
+                                        <p:tgtEl>
+                                          <p:spTgt spid="10"/>
+                                        </p:tgtEl>
+                                        <p:attrNameLst>
+                                          <p:attrName>style.visibility</p:attrName>
+                                        </p:attrNameLst>
+                                      </p:cBhvr>
+                                      <p:to>
+                                        <p:strVal val="visible"/>
+                                      </p:to>
+                                    </p:set>
+                                    <p:animEffect transition="in" filter="fade">
+                                      <p:cBhvr>
+                                        <p:cTn id="7" dur="500"/>
+                                        <p:tgtEl>
+                                          <p:spTgt spid="10"/>
+                                        </p:tgtEl>
+                                      </p:cBhvr>
+                                    </p:animEffect>
+                                  </p:childTnLst>
+                                </p:cTn>
+                              </p:par>
+                            </p:childTnLst>
+                          </p:cTn>
+                        </p:par>
+                      </p:childTnLst>
+                    </p:cTn>
+                  </p:par>
+                </p:childTnLst>
+              </p:cTn>
+              <p:prevCondLst>
+                <p:cond evt="onPrev" delay="0">
+                  <p:tgtEl>
+                    <p:sldTgt/>
+                  </p:tgtEl>
+                </p:cond>
+              </p:prevCondLst>
+              <p:nextCondLst>
+                <p:cond evt="onNext" delay="0">
+                  <p:tgtEl>
+                    <p:sldTgt/>
+                  </p:tgtEl>
+                </p:cond>
+              </p:nextCondLst>
+            </p:seq>
+          </p:childTnLst>
+        </p:cTn>
+      </p:par>
+    </p:tnLst>
+  </p:timing>
+</p:sld>
+</file>
+
+<file path=ppt/slides/slide9.xml><?xml version="1.0" encoding="utf-8"?>
+<p:sld xmlns:a="http://schemas.openxmlformats.org/drawingml/2006/main" xmlns:r="http://schemas.openxmlformats.org/officeDocument/2006/relationships" xmlns:p="http://schemas.openxmlformats.org/presentationml/2006/main">
+  <p:cSld>
+    <p:spTree>
+      <p:nvGrpSpPr>
+        <p:cNvPr id="1" name=""/>
+        <p:cNvGrpSpPr/>
+        <p:nvPr/>
+      </p:nvGrpSpPr>
+      <p:grpSpPr>
+        <a:xfrm>
+          <a:off x="0" y="0"/>
+          <a:ext cx="0" cy="0"/>
+          <a:chOff x="0" y="0"/>
+          <a:chExt cx="0" cy="0"/>
+        </a:xfrm>
+      </p:grpSpPr>
+      <p:sp>
+        <p:nvSpPr>
+          <p:cNvPr id="2" name="Titre 1">
+            <a:extLst>
+              <a:ext uri="{FF2B5EF4-FFF2-40B4-BE49-F238E27FC236}">
+                <a16:creationId xmlns:a16="http://schemas.microsoft.com/office/drawing/2014/main" id="{3328684C-27C5-4573-8BD1-2AAF87373B35}"/>
+              </a:ext>
+            </a:extLst>
+          </p:cNvPr>
+          <p:cNvSpPr>
+            <a:spLocks noGrp="1"/>
+          </p:cNvSpPr>
+          <p:nvPr>
+            <p:ph type="title"/>
+          </p:nvPr>
+        </p:nvSpPr>
+        <p:spPr/>
+        <p:txBody>
+          <a:bodyPr/>
+          <a:lstStyle/>
+          <a:p>
+            <a:r>
+              <a:rPr lang="fr-BE" dirty="0"/>
+              <a:t>Software</a:t>
+            </a:r>
+          </a:p>
+        </p:txBody>
+      </p:sp>
+      <p:sp>
+        <p:nvSpPr>
+          <p:cNvPr id="3" name="Espace réservé du contenu 2">
+            <a:extLst>
+              <a:ext uri="{FF2B5EF4-FFF2-40B4-BE49-F238E27FC236}">
+                <a16:creationId xmlns:a16="http://schemas.microsoft.com/office/drawing/2014/main" id="{904F9E68-5055-4F80-B6A4-3B277D1A4E17}"/>
+              </a:ext>
+            </a:extLst>
+          </p:cNvPr>
+          <p:cNvSpPr>
+            <a:spLocks noGrp="1"/>
+          </p:cNvSpPr>
+          <p:nvPr>
+            <p:ph idx="1"/>
+          </p:nvPr>
+        </p:nvSpPr>
+        <p:spPr/>
+        <p:txBody>
+          <a:bodyPr/>
+          <a:lstStyle/>
+          <a:p>
+            <a:pPr marL="0" indent="0">
+              <a:buNone/>
+            </a:pPr>
+            <a:r>
+              <a:rPr lang="fr-BE" u="sng" dirty="0">
+                <a:effectLst>
+                  <a:outerShdw blurRad="38100" dist="38100" dir="2700000" algn="tl">
+                    <a:srgbClr val="000000">
+                      <a:alpha val="43137"/>
+                    </a:srgbClr>
+                  </a:outerShdw>
+                </a:effectLst>
+              </a:rPr>
+              <a:t>Fonctionnement API (</a:t>
+            </a:r>
+            <a:r>
+              <a:rPr lang="fr-BE" u="sng" dirty="0" err="1">
+                <a:effectLst>
+                  <a:outerShdw blurRad="38100" dist="38100" dir="2700000" algn="tl">
+                    <a:srgbClr val="000000">
+                      <a:alpha val="43137"/>
+                    </a:srgbClr>
+                  </a:outerShdw>
+                </a:effectLst>
+              </a:rPr>
+              <a:t>Users</a:t>
+            </a:r>
+            <a:r>
+              <a:rPr lang="fr-BE" u="sng" dirty="0">
+                <a:effectLst>
+                  <a:outerShdw blurRad="38100" dist="38100" dir="2700000" algn="tl">
+                    <a:srgbClr val="000000">
+                      <a:alpha val="43137"/>
+                    </a:srgbClr>
+                  </a:outerShdw>
+                </a:effectLst>
+              </a:rPr>
+              <a:t>):</a:t>
+            </a:r>
+          </a:p>
+        </p:txBody>
+      </p:sp>
+      <p:sp>
+        <p:nvSpPr>
+          <p:cNvPr id="4" name="Espace réservé de la date 3">
+            <a:extLst>
+              <a:ext uri="{FF2B5EF4-FFF2-40B4-BE49-F238E27FC236}">
+                <a16:creationId xmlns:a16="http://schemas.microsoft.com/office/drawing/2014/main" id="{1AAF3538-66FA-45FA-91DF-389B5B7A7172}"/>
+              </a:ext>
+            </a:extLst>
+          </p:cNvPr>
+          <p:cNvSpPr>
+            <a:spLocks noGrp="1"/>
+          </p:cNvSpPr>
+          <p:nvPr>
+            <p:ph type="dt" sz="half" idx="10"/>
+          </p:nvPr>
+        </p:nvSpPr>
+        <p:spPr/>
+        <p:txBody>
+          <a:bodyPr/>
+          <a:lstStyle/>
+          <a:p>
+            <a:fld id="{7F44ED6C-F45B-4CA7-82D8-BC1E073DDDCA}" type="datetime1">
+              <a:rPr lang="fr-BE" smtClean="0"/>
+              <a:pPr/>
+              <a:t>20-01-19</a:t>
+            </a:fld>
+            <a:endParaRPr lang="fr-BE"/>
+          </a:p>
+        </p:txBody>
+      </p:sp>
+      <p:sp>
+        <p:nvSpPr>
+          <p:cNvPr id="5" name="Espace réservé du pied de page 4">
+            <a:extLst>
+              <a:ext uri="{FF2B5EF4-FFF2-40B4-BE49-F238E27FC236}">
+                <a16:creationId xmlns:a16="http://schemas.microsoft.com/office/drawing/2014/main" id="{0AC11A48-F826-44FF-9ECF-9F8BECA04C03}"/>
+              </a:ext>
+            </a:extLst>
+          </p:cNvPr>
+          <p:cNvSpPr>
+            <a:spLocks noGrp="1"/>
+          </p:cNvSpPr>
+          <p:nvPr>
+            <p:ph type="ftr" sz="quarter" idx="11"/>
+          </p:nvPr>
+        </p:nvSpPr>
+        <p:spPr/>
+        <p:txBody>
+          <a:bodyPr/>
+          <a:lstStyle/>
+          <a:p>
+            <a:r>
+              <a:rPr lang="fr-BE"/>
+              <a:t>www.heh.be</a:t>
+            </a:r>
+            <a:endParaRPr lang="fr-BE" dirty="0"/>
+          </a:p>
+        </p:txBody>
+      </p:sp>
+      <p:sp>
+        <p:nvSpPr>
+          <p:cNvPr id="6" name="Espace réservé du numéro de diapositive 5">
+            <a:extLst>
+              <a:ext uri="{FF2B5EF4-FFF2-40B4-BE49-F238E27FC236}">
+                <a16:creationId xmlns:a16="http://schemas.microsoft.com/office/drawing/2014/main" id="{BB324517-0111-4BC7-9BB4-9BCEF0E4D590}"/>
+              </a:ext>
+            </a:extLst>
+          </p:cNvPr>
+          <p:cNvSpPr>
+            <a:spLocks noGrp="1"/>
+          </p:cNvSpPr>
+          <p:nvPr>
+            <p:ph type="sldNum" sz="quarter" idx="12"/>
+          </p:nvPr>
+        </p:nvSpPr>
+        <p:spPr/>
+        <p:txBody>
+          <a:bodyPr/>
+          <a:lstStyle/>
+          <a:p>
+            <a:fld id="{F8B969FB-3CDB-4BA7-BB65-4C9B3D66EC11}" type="slidenum">
+              <a:rPr lang="fr-BE" smtClean="0"/>
+              <a:pPr/>
+              <a:t>9</a:t>
+            </a:fld>
+            <a:endParaRPr lang="fr-BE"/>
+          </a:p>
+        </p:txBody>
+      </p:sp>
+      <p:pic>
+        <p:nvPicPr>
+          <p:cNvPr id="13" name="Image 12">
+            <a:extLst>
+              <a:ext uri="{FF2B5EF4-FFF2-40B4-BE49-F238E27FC236}">
+                <a16:creationId xmlns:a16="http://schemas.microsoft.com/office/drawing/2014/main" id="{1B57F6C0-BD4D-481F-A5E3-7B57DFF8F073}"/>
+              </a:ext>
+            </a:extLst>
+          </p:cNvPr>
+          <p:cNvPicPr>
+            <a:picLocks noChangeAspect="1"/>
+          </p:cNvPicPr>
+          <p:nvPr/>
+        </p:nvPicPr>
+        <p:blipFill>
+          <a:blip r:embed="rId2">
+            <a:extLst>
+              <a:ext uri="{28A0092B-C50C-407E-A947-70E740481C1C}">
+                <a14:useLocalDpi xmlns:a14="http://schemas.microsoft.com/office/drawing/2010/main" val="0"/>
+              </a:ext>
+            </a:extLst>
+          </a:blip>
+          <a:stretch>
+            <a:fillRect/>
+          </a:stretch>
+        </p:blipFill>
+        <p:spPr>
+          <a:xfrm>
+            <a:off x="2556160" y="1360135"/>
+            <a:ext cx="5698207" cy="4818668"/>
+          </a:xfrm>
+          <a:prstGeom prst="rect">
+            <a:avLst/>
+          </a:prstGeom>
+        </p:spPr>
+      </p:pic>
+    </p:spTree>
+    <p:extLst>
+      <p:ext uri="{BB962C8B-B14F-4D97-AF65-F5344CB8AC3E}">
+        <p14:creationId xmlns:p14="http://schemas.microsoft.com/office/powerpoint/2010/main" val="1153252446"/>
+      </p:ext>
+    </p:extLst>
+  </p:cSld>
+  <p:clrMapOvr>
+    <a:masterClrMapping/>
+  </p:clrMapOvr>
+  <p:transition spd="slow">
+    <p:cover/>
+  </p:transition>
+  <p:timing>
+    <p:tnLst>
+      <p:par>
+        <p:cTn id="1" dur="indefinite" restart="never" nodeType="tmRoot">
+          <p:childTnLst>
+            <p:seq concurrent="1" nextAc="seek">
+              <p:cTn id="2" dur="indefinite" nodeType="mainSeq">
+                <p:childTnLst>
+                  <p:par>
+                    <p:cTn id="3" fill="hold">
+                      <p:stCondLst>
+                        <p:cond delay="indefinite"/>
+                      </p:stCondLst>
+                      <p:childTnLst>
+                        <p:par>
+                          <p:cTn id="4" fill="hold">
+                            <p:stCondLst>
+                              <p:cond delay="0"/>
+                            </p:stCondLst>
+                            <p:childTnLst>
+                              <p:par>
+                                <p:cTn id="5" presetID="10" presetClass="entr" presetSubtype="0" fill="hold" nodeType="clickEffect">
+                                  <p:stCondLst>
+                                    <p:cond delay="0"/>
+                                  </p:stCondLst>
+                                  <p:childTnLst>
+                                    <p:set>
+                                      <p:cBhvr>
+                                        <p:cTn id="6" dur="1" fill="hold">
+                                          <p:stCondLst>
+                                            <p:cond delay="0"/>
+                                          </p:stCondLst>
+                                        </p:cTn>
+                                        <p:tgtEl>
+                                          <p:spTgt spid="13"/>
+                                        </p:tgtEl>
+                                        <p:attrNameLst>
+                                          <p:attrName>style.visibility</p:attrName>
+                                        </p:attrNameLst>
+                                      </p:cBhvr>
+                                      <p:to>
+                                        <p:strVal val="visible"/>
+                                      </p:to>
+                                    </p:set>
+                                    <p:animEffect transition="in" filter="fade">
+                                      <p:cBhvr>
+                                        <p:cTn id="7" dur="500"/>
+                                        <p:tgtEl>
+                                          <p:spTgt spid="13"/>
                                         </p:tgtEl>
                                       </p:cBhvr>
                                     </p:animEffect>

</xml_diff>